<commit_message>
Update slides with final sponsor logos
</commit_message>
<xml_diff>
--- a/public/media_assets/DSW17_TEMPLATE 16_9.pptx
+++ b/public/media_assets/DSW17_TEMPLATE 16_9.pptx
@@ -3114,8 +3114,8 @@
         </p:nvSpPr>
         <p:spPr>
           <a:xfrm>
-            <a:off x="1280591" y="8077199"/>
-            <a:ext cx="21784718" cy="863601"/>
+            <a:off x="1280591" y="8070850"/>
+            <a:ext cx="21784718" cy="876301"/>
           </a:xfrm>
           <a:prstGeom prst="rect">
             <a:avLst/>
@@ -3139,10 +3139,10 @@
                 <a:solidFill>
                   <a:srgbClr val="53585F"/>
                 </a:solidFill>
-                <a:latin typeface="Helvetica"/>
-                <a:ea typeface="Helvetica"/>
-                <a:cs typeface="Helvetica"/>
-                <a:sym typeface="Helvetica"/>
+                <a:latin typeface="Montserrat"/>
+                <a:ea typeface="Montserrat"/>
+                <a:cs typeface="Montserrat"/>
+                <a:sym typeface="Montserrat"/>
               </a:defRPr>
             </a:lvl1pPr>
           </a:lstStyle>
@@ -3163,7 +3163,7 @@
         <p:spPr>
           <a:xfrm>
             <a:off x="1305991" y="9488518"/>
-            <a:ext cx="21784718" cy="1163321"/>
+            <a:ext cx="21784718" cy="1191261"/>
           </a:xfrm>
           <a:prstGeom prst="rect">
             <a:avLst/>
@@ -3343,8 +3343,8 @@
         </p:nvSpPr>
         <p:spPr>
           <a:xfrm>
-            <a:off x="1286941" y="2997199"/>
-            <a:ext cx="21784718" cy="863601"/>
+            <a:off x="1286941" y="2990850"/>
+            <a:ext cx="21784718" cy="876301"/>
           </a:xfrm>
           <a:prstGeom prst="rect">
             <a:avLst/>
@@ -3368,10 +3368,10 @@
                 <a:solidFill>
                   <a:srgbClr val="53585F"/>
                 </a:solidFill>
-                <a:latin typeface="Helvetica"/>
-                <a:ea typeface="Helvetica"/>
-                <a:cs typeface="Helvetica"/>
-                <a:sym typeface="Helvetica"/>
+                <a:latin typeface="Montserrat"/>
+                <a:ea typeface="Montserrat"/>
+                <a:cs typeface="Montserrat"/>
+                <a:sym typeface="Montserrat"/>
               </a:defRPr>
             </a:lvl1pPr>
           </a:lstStyle>
@@ -3392,7 +3392,7 @@
         <p:spPr>
           <a:xfrm>
             <a:off x="1286941" y="4573618"/>
-            <a:ext cx="21784718" cy="1739901"/>
+            <a:ext cx="21784718" cy="1778001"/>
           </a:xfrm>
           <a:prstGeom prst="rect">
             <a:avLst/>
@@ -3416,10 +3416,10 @@
                 <a:solidFill>
                   <a:srgbClr val="797979"/>
                 </a:solidFill>
-                <a:latin typeface="Helvetica"/>
-                <a:ea typeface="Helvetica"/>
-                <a:cs typeface="Helvetica"/>
-                <a:sym typeface="Helvetica"/>
+                <a:latin typeface="Montserrat"/>
+                <a:ea typeface="Montserrat"/>
+                <a:cs typeface="Montserrat"/>
+                <a:sym typeface="Montserrat"/>
               </a:defRPr>
             </a:lvl1pPr>
           </a:lstStyle>
@@ -3523,8 +3523,8 @@
         </p:nvSpPr>
         <p:spPr>
           <a:xfrm>
-            <a:off x="1286941" y="2997199"/>
-            <a:ext cx="21784718" cy="863601"/>
+            <a:off x="1286941" y="2990850"/>
+            <a:ext cx="21784718" cy="876301"/>
           </a:xfrm>
           <a:prstGeom prst="rect">
             <a:avLst/>
@@ -3548,10 +3548,10 @@
                 <a:solidFill>
                   <a:srgbClr val="53585F"/>
                 </a:solidFill>
-                <a:latin typeface="Helvetica"/>
-                <a:ea typeface="Helvetica"/>
-                <a:cs typeface="Helvetica"/>
-                <a:sym typeface="Helvetica"/>
+                <a:latin typeface="Montserrat"/>
+                <a:ea typeface="Montserrat"/>
+                <a:cs typeface="Montserrat"/>
+                <a:sym typeface="Montserrat"/>
               </a:defRPr>
             </a:lvl1pPr>
           </a:lstStyle>
@@ -3572,7 +3572,7 @@
         <p:spPr>
           <a:xfrm>
             <a:off x="1286941" y="4573618"/>
-            <a:ext cx="21784718" cy="4140201"/>
+            <a:ext cx="21784718" cy="4216401"/>
           </a:xfrm>
           <a:prstGeom prst="rect">
             <a:avLst/>
@@ -3605,10 +3605,10 @@
                 <a:solidFill>
                   <a:srgbClr val="797979"/>
                 </a:solidFill>
-                <a:latin typeface="Helvetica"/>
-                <a:ea typeface="Helvetica"/>
-                <a:cs typeface="Helvetica"/>
-                <a:sym typeface="Helvetica"/>
+                <a:latin typeface="Montserrat"/>
+                <a:ea typeface="Montserrat"/>
+                <a:cs typeface="Montserrat"/>
+                <a:sym typeface="Montserrat"/>
               </a:defRPr>
             </a:pPr>
             <a:r>
@@ -3629,10 +3629,10 @@
                 <a:solidFill>
                   <a:srgbClr val="797979"/>
                 </a:solidFill>
-                <a:latin typeface="Helvetica"/>
-                <a:ea typeface="Helvetica"/>
-                <a:cs typeface="Helvetica"/>
-                <a:sym typeface="Helvetica"/>
+                <a:latin typeface="Montserrat"/>
+                <a:ea typeface="Montserrat"/>
+                <a:cs typeface="Montserrat"/>
+                <a:sym typeface="Montserrat"/>
               </a:defRPr>
             </a:pPr>
             <a:r>
@@ -3653,10 +3653,10 @@
                 <a:solidFill>
                   <a:srgbClr val="797979"/>
                 </a:solidFill>
-                <a:latin typeface="Helvetica"/>
-                <a:ea typeface="Helvetica"/>
-                <a:cs typeface="Helvetica"/>
-                <a:sym typeface="Helvetica"/>
+                <a:latin typeface="Montserrat"/>
+                <a:ea typeface="Montserrat"/>
+                <a:cs typeface="Montserrat"/>
+                <a:sym typeface="Montserrat"/>
               </a:defRPr>
             </a:pPr>
             <a:r>
@@ -3677,10 +3677,10 @@
                 <a:solidFill>
                   <a:srgbClr val="797979"/>
                 </a:solidFill>
-                <a:latin typeface="Helvetica"/>
-                <a:ea typeface="Helvetica"/>
-                <a:cs typeface="Helvetica"/>
-                <a:sym typeface="Helvetica"/>
+                <a:latin typeface="Montserrat"/>
+                <a:ea typeface="Montserrat"/>
+                <a:cs typeface="Montserrat"/>
+                <a:sym typeface="Montserrat"/>
               </a:defRPr>
             </a:pPr>
             <a:r>
@@ -3781,8 +3781,8 @@
         </p:nvSpPr>
         <p:spPr>
           <a:xfrm>
-            <a:off x="12399441" y="2997199"/>
-            <a:ext cx="21784718" cy="863601"/>
+            <a:off x="12399441" y="2990850"/>
+            <a:ext cx="21784718" cy="876301"/>
           </a:xfrm>
           <a:prstGeom prst="rect">
             <a:avLst/>
@@ -3806,10 +3806,10 @@
                 <a:solidFill>
                   <a:srgbClr val="53585F"/>
                 </a:solidFill>
-                <a:latin typeface="Helvetica"/>
-                <a:ea typeface="Helvetica"/>
-                <a:cs typeface="Helvetica"/>
-                <a:sym typeface="Helvetica"/>
+                <a:latin typeface="Montserrat"/>
+                <a:ea typeface="Montserrat"/>
+                <a:cs typeface="Montserrat"/>
+                <a:sym typeface="Montserrat"/>
               </a:defRPr>
             </a:lvl1pPr>
           </a:lstStyle>
@@ -3830,7 +3830,7 @@
         <p:spPr>
           <a:xfrm>
             <a:off x="12353552" y="4573618"/>
-            <a:ext cx="10490053" cy="2832101"/>
+            <a:ext cx="10490053" cy="3454401"/>
           </a:xfrm>
           <a:prstGeom prst="rect">
             <a:avLst/>
@@ -3854,10 +3854,10 @@
                 <a:solidFill>
                   <a:srgbClr val="797979"/>
                 </a:solidFill>
-                <a:latin typeface="Helvetica"/>
-                <a:ea typeface="Helvetica"/>
-                <a:cs typeface="Helvetica"/>
-                <a:sym typeface="Helvetica"/>
+                <a:latin typeface="Montserrat"/>
+                <a:ea typeface="Montserrat"/>
+                <a:cs typeface="Montserrat"/>
+                <a:sym typeface="Montserrat"/>
               </a:defRPr>
             </a:lvl1pPr>
           </a:lstStyle>
@@ -3933,8 +3933,8 @@
         </p:nvSpPr>
         <p:spPr>
           <a:xfrm>
-            <a:off x="1286941" y="685799"/>
-            <a:ext cx="21784718" cy="863601"/>
+            <a:off x="1286941" y="679450"/>
+            <a:ext cx="21784718" cy="876301"/>
           </a:xfrm>
           <a:prstGeom prst="rect">
             <a:avLst/>
@@ -3958,10 +3958,10 @@
                 <a:solidFill>
                   <a:srgbClr val="53585F"/>
                 </a:solidFill>
-                <a:latin typeface="Helvetica"/>
-                <a:ea typeface="Helvetica"/>
-                <a:cs typeface="Helvetica"/>
-                <a:sym typeface="Helvetica"/>
+                <a:latin typeface="Montserrat"/>
+                <a:ea typeface="Montserrat"/>
+                <a:cs typeface="Montserrat"/>
+                <a:sym typeface="Montserrat"/>
               </a:defRPr>
             </a:lvl1pPr>
           </a:lstStyle>
@@ -4012,8 +4012,8 @@
         </p:nvSpPr>
         <p:spPr>
           <a:xfrm>
-            <a:off x="1286941" y="6334124"/>
-            <a:ext cx="21784718" cy="863601"/>
+            <a:off x="1286941" y="6327775"/>
+            <a:ext cx="21784718" cy="876301"/>
           </a:xfrm>
           <a:prstGeom prst="rect">
             <a:avLst/>
@@ -4037,10 +4037,10 @@
                 <a:solidFill>
                   <a:srgbClr val="53585F"/>
                 </a:solidFill>
-                <a:latin typeface="Helvetica"/>
-                <a:ea typeface="Helvetica"/>
-                <a:cs typeface="Helvetica"/>
-                <a:sym typeface="Helvetica"/>
+                <a:latin typeface="Montserrat"/>
+                <a:ea typeface="Montserrat"/>
+                <a:cs typeface="Montserrat"/>
+                <a:sym typeface="Montserrat"/>
               </a:defRPr>
             </a:lvl1pPr>
           </a:lstStyle>
@@ -4091,10 +4091,10 @@
         </p:nvGrpSpPr>
         <p:grpSpPr>
           <a:xfrm>
-            <a:off x="1371600" y="8555334"/>
-            <a:ext cx="14122523" cy="2921001"/>
+            <a:off x="1371599" y="8555335"/>
+            <a:ext cx="14122525" cy="2921001"/>
             <a:chOff x="42245" y="447217"/>
-            <a:chExt cx="14122522" cy="2921000"/>
+            <a:chExt cx="14122523" cy="2921000"/>
           </a:xfrm>
         </p:grpSpPr>
         <p:pic>
@@ -4210,7 +4210,7 @@
           </p:blipFill>
           <p:spPr>
             <a:xfrm>
-              <a:off x="10318765" y="639843"/>
+              <a:off x="10318766" y="639843"/>
               <a:ext cx="3846004" cy="880101"/>
             </a:xfrm>
             <a:prstGeom prst="rect">
@@ -4242,7 +4242,7 @@
           <p:spPr>
             <a:xfrm>
               <a:off x="5334526" y="2089003"/>
-              <a:ext cx="3461404" cy="1279215"/>
+              <a:ext cx="3461403" cy="1279215"/>
             </a:xfrm>
             <a:prstGeom prst="rect">
               <a:avLst/>
@@ -4522,8 +4522,8 @@
         </p:nvSpPr>
         <p:spPr>
           <a:xfrm>
-            <a:off x="1286941" y="685799"/>
-            <a:ext cx="21784718" cy="863601"/>
+            <a:off x="1286941" y="679450"/>
+            <a:ext cx="21784718" cy="876301"/>
           </a:xfrm>
           <a:prstGeom prst="rect">
             <a:avLst/>
@@ -4547,10 +4547,10 @@
                 <a:solidFill>
                   <a:srgbClr val="53585F"/>
                 </a:solidFill>
-                <a:latin typeface="Helvetica"/>
-                <a:ea typeface="Helvetica"/>
-                <a:cs typeface="Helvetica"/>
-                <a:sym typeface="Helvetica"/>
+                <a:latin typeface="Montserrat"/>
+                <a:ea typeface="Montserrat"/>
+                <a:cs typeface="Montserrat"/>
+                <a:sym typeface="Montserrat"/>
               </a:defRPr>
             </a:lvl1pPr>
           </a:lstStyle>
@@ -4601,8 +4601,8 @@
         </p:nvSpPr>
         <p:spPr>
           <a:xfrm>
-            <a:off x="1286941" y="5643291"/>
-            <a:ext cx="7584034" cy="863601"/>
+            <a:off x="1286941" y="5636941"/>
+            <a:ext cx="7584034" cy="876301"/>
           </a:xfrm>
           <a:prstGeom prst="rect">
             <a:avLst/>
@@ -4626,10 +4626,10 @@
                 <a:solidFill>
                   <a:srgbClr val="53585F"/>
                 </a:solidFill>
-                <a:latin typeface="Helvetica"/>
-                <a:ea typeface="Helvetica"/>
-                <a:cs typeface="Helvetica"/>
-                <a:sym typeface="Helvetica"/>
+                <a:latin typeface="Montserrat"/>
+                <a:ea typeface="Montserrat"/>
+                <a:cs typeface="Montserrat"/>
+                <a:sym typeface="Montserrat"/>
               </a:defRPr>
             </a:lvl1pPr>
           </a:lstStyle>
@@ -4709,8 +4709,8 @@
         </p:nvSpPr>
         <p:spPr>
           <a:xfrm>
-            <a:off x="11561241" y="5643291"/>
-            <a:ext cx="7584034" cy="863601"/>
+            <a:off x="11561241" y="5636941"/>
+            <a:ext cx="7584034" cy="876301"/>
           </a:xfrm>
           <a:prstGeom prst="rect">
             <a:avLst/>
@@ -4734,10 +4734,10 @@
                 <a:solidFill>
                   <a:srgbClr val="53585F"/>
                 </a:solidFill>
-                <a:latin typeface="Helvetica"/>
-                <a:ea typeface="Helvetica"/>
-                <a:cs typeface="Helvetica"/>
-                <a:sym typeface="Helvetica"/>
+                <a:latin typeface="Montserrat"/>
+                <a:ea typeface="Montserrat"/>
+                <a:cs typeface="Montserrat"/>
+                <a:sym typeface="Montserrat"/>
               </a:defRPr>
             </a:lvl1pPr>
           </a:lstStyle>
@@ -4781,10 +4781,10 @@
                 <a:solidFill>
                   <a:srgbClr val="797979"/>
                 </a:solidFill>
-                <a:latin typeface="Helvetica"/>
-                <a:ea typeface="Helvetica"/>
-                <a:cs typeface="Helvetica"/>
-                <a:sym typeface="Helvetica"/>
+                <a:latin typeface="Montserrat"/>
+                <a:ea typeface="Montserrat"/>
+                <a:cs typeface="Montserrat"/>
+                <a:sym typeface="Montserrat"/>
               </a:defRPr>
             </a:pPr>
             <a:r>
@@ -4797,10 +4797,10 @@
                 <a:solidFill>
                   <a:srgbClr val="797979"/>
                 </a:solidFill>
-                <a:latin typeface="Helvetica"/>
-                <a:ea typeface="Helvetica"/>
-                <a:cs typeface="Helvetica"/>
-                <a:sym typeface="Helvetica"/>
+                <a:latin typeface="Montserrat"/>
+                <a:ea typeface="Montserrat"/>
+                <a:cs typeface="Montserrat"/>
+                <a:sym typeface="Montserrat"/>
               </a:defRPr>
             </a:pPr>
             <a:r>
@@ -4813,10 +4813,10 @@
                 <a:solidFill>
                   <a:srgbClr val="797979"/>
                 </a:solidFill>
-                <a:latin typeface="Helvetica"/>
-                <a:ea typeface="Helvetica"/>
-                <a:cs typeface="Helvetica"/>
-                <a:sym typeface="Helvetica"/>
+                <a:latin typeface="Montserrat"/>
+                <a:ea typeface="Montserrat"/>
+                <a:cs typeface="Montserrat"/>
+                <a:sym typeface="Montserrat"/>
               </a:defRPr>
             </a:pPr>
             <a:r>
@@ -4829,10 +4829,10 @@
                 <a:solidFill>
                   <a:srgbClr val="797979"/>
                 </a:solidFill>
-                <a:latin typeface="Helvetica"/>
-                <a:ea typeface="Helvetica"/>
-                <a:cs typeface="Helvetica"/>
-                <a:sym typeface="Helvetica"/>
+                <a:latin typeface="Montserrat"/>
+                <a:ea typeface="Montserrat"/>
+                <a:cs typeface="Montserrat"/>
+                <a:sym typeface="Montserrat"/>
               </a:defRPr>
             </a:pPr>
             <a:r>
@@ -4845,10 +4845,10 @@
                 <a:solidFill>
                   <a:srgbClr val="797979"/>
                 </a:solidFill>
-                <a:latin typeface="Helvetica"/>
-                <a:ea typeface="Helvetica"/>
-                <a:cs typeface="Helvetica"/>
-                <a:sym typeface="Helvetica"/>
+                <a:latin typeface="Montserrat"/>
+                <a:ea typeface="Montserrat"/>
+                <a:cs typeface="Montserrat"/>
+                <a:sym typeface="Montserrat"/>
               </a:defRPr>
             </a:pPr>
             <a:r>
@@ -4861,10 +4861,10 @@
                 <a:solidFill>
                   <a:srgbClr val="797979"/>
                 </a:solidFill>
-                <a:latin typeface="Helvetica"/>
-                <a:ea typeface="Helvetica"/>
-                <a:cs typeface="Helvetica"/>
-                <a:sym typeface="Helvetica"/>
+                <a:latin typeface="Montserrat"/>
+                <a:ea typeface="Montserrat"/>
+                <a:cs typeface="Montserrat"/>
+                <a:sym typeface="Montserrat"/>
               </a:defRPr>
             </a:pPr>
             <a:r>
@@ -4877,10 +4877,10 @@
                 <a:solidFill>
                   <a:srgbClr val="797979"/>
                 </a:solidFill>
-                <a:latin typeface="Helvetica"/>
-                <a:ea typeface="Helvetica"/>
-                <a:cs typeface="Helvetica"/>
-                <a:sym typeface="Helvetica"/>
+                <a:latin typeface="Montserrat"/>
+                <a:ea typeface="Montserrat"/>
+                <a:cs typeface="Montserrat"/>
+                <a:sym typeface="Montserrat"/>
               </a:defRPr>
             </a:pPr>
             <a:r>
@@ -4893,10 +4893,10 @@
                 <a:solidFill>
                   <a:srgbClr val="797979"/>
                 </a:solidFill>
-                <a:latin typeface="Helvetica"/>
-                <a:ea typeface="Helvetica"/>
-                <a:cs typeface="Helvetica"/>
-                <a:sym typeface="Helvetica"/>
+                <a:latin typeface="Montserrat"/>
+                <a:ea typeface="Montserrat"/>
+                <a:cs typeface="Montserrat"/>
+                <a:sym typeface="Montserrat"/>
               </a:defRPr>
             </a:pPr>
             <a:r>
@@ -4909,10 +4909,10 @@
                 <a:solidFill>
                   <a:srgbClr val="797979"/>
                 </a:solidFill>
-                <a:latin typeface="Helvetica"/>
-                <a:ea typeface="Helvetica"/>
-                <a:cs typeface="Helvetica"/>
-                <a:sym typeface="Helvetica"/>
+                <a:latin typeface="Montserrat"/>
+                <a:ea typeface="Montserrat"/>
+                <a:cs typeface="Montserrat"/>
+                <a:sym typeface="Montserrat"/>
               </a:defRPr>
             </a:pPr>
             <a:r>
@@ -4925,10 +4925,10 @@
                 <a:solidFill>
                   <a:srgbClr val="797979"/>
                 </a:solidFill>
-                <a:latin typeface="Helvetica"/>
-                <a:ea typeface="Helvetica"/>
-                <a:cs typeface="Helvetica"/>
-                <a:sym typeface="Helvetica"/>
+                <a:latin typeface="Montserrat"/>
+                <a:ea typeface="Montserrat"/>
+                <a:cs typeface="Montserrat"/>
+                <a:sym typeface="Montserrat"/>
               </a:defRPr>
             </a:pPr>
             <a:r>
@@ -4941,10 +4941,10 @@
                 <a:solidFill>
                   <a:srgbClr val="797979"/>
                 </a:solidFill>
-                <a:latin typeface="Helvetica"/>
-                <a:ea typeface="Helvetica"/>
-                <a:cs typeface="Helvetica"/>
-                <a:sym typeface="Helvetica"/>
+                <a:latin typeface="Montserrat"/>
+                <a:ea typeface="Montserrat"/>
+                <a:cs typeface="Montserrat"/>
+                <a:sym typeface="Montserrat"/>
               </a:defRPr>
             </a:pPr>
             <a:r>
@@ -4957,10 +4957,10 @@
                 <a:solidFill>
                   <a:srgbClr val="797979"/>
                 </a:solidFill>
-                <a:latin typeface="Helvetica"/>
-                <a:ea typeface="Helvetica"/>
-                <a:cs typeface="Helvetica"/>
-                <a:sym typeface="Helvetica"/>
+                <a:latin typeface="Montserrat"/>
+                <a:ea typeface="Montserrat"/>
+                <a:cs typeface="Montserrat"/>
+                <a:sym typeface="Montserrat"/>
               </a:defRPr>
             </a:pPr>
             <a:r>
@@ -4973,14 +4973,14 @@
                 <a:solidFill>
                   <a:srgbClr val="797979"/>
                 </a:solidFill>
-                <a:latin typeface="Helvetica"/>
-                <a:ea typeface="Helvetica"/>
-                <a:cs typeface="Helvetica"/>
-                <a:sym typeface="Helvetica"/>
+                <a:latin typeface="Montserrat"/>
+                <a:ea typeface="Montserrat"/>
+                <a:cs typeface="Montserrat"/>
+                <a:sym typeface="Montserrat"/>
               </a:defRPr>
             </a:pPr>
             <a:r>
-              <a:t>General Assembly</a:t>
+              <a:t>Gary Community Investments</a:t>
             </a:r>
           </a:p>
           <a:p>
@@ -4989,14 +4989,14 @@
                 <a:solidFill>
                   <a:srgbClr val="797979"/>
                 </a:solidFill>
-                <a:latin typeface="Helvetica"/>
-                <a:ea typeface="Helvetica"/>
-                <a:cs typeface="Helvetica"/>
-                <a:sym typeface="Helvetica"/>
+                <a:latin typeface="Montserrat"/>
+                <a:ea typeface="Montserrat"/>
+                <a:cs typeface="Montserrat"/>
+                <a:sym typeface="Montserrat"/>
               </a:defRPr>
             </a:pPr>
             <a:r>
-              <a:t>Nanno</a:t>
+              <a:t>General Assembly</a:t>
             </a:r>
           </a:p>
           <a:p>
@@ -5005,14 +5005,14 @@
                 <a:solidFill>
                   <a:srgbClr val="797979"/>
                 </a:solidFill>
-                <a:latin typeface="Helvetica"/>
-                <a:ea typeface="Helvetica"/>
-                <a:cs typeface="Helvetica"/>
-                <a:sym typeface="Helvetica"/>
+                <a:latin typeface="Montserrat"/>
+                <a:ea typeface="Montserrat"/>
+                <a:cs typeface="Montserrat"/>
+                <a:sym typeface="Montserrat"/>
               </a:defRPr>
             </a:pPr>
             <a:r>
-              <a:t>Pass Gas Denver</a:t>
+              <a:t>GroundFloor Media</a:t>
             </a:r>
           </a:p>
           <a:p>
@@ -5021,14 +5021,14 @@
                 <a:solidFill>
                   <a:srgbClr val="797979"/>
                 </a:solidFill>
-                <a:latin typeface="Helvetica"/>
-                <a:ea typeface="Helvetica"/>
-                <a:cs typeface="Helvetica"/>
-                <a:sym typeface="Helvetica"/>
+                <a:latin typeface="Montserrat"/>
+                <a:ea typeface="Montserrat"/>
+                <a:cs typeface="Montserrat"/>
+                <a:sym typeface="Montserrat"/>
               </a:defRPr>
             </a:pPr>
             <a:r>
-              <a:t>Slalom</a:t>
+              <a:t>Guiceworks</a:t>
             </a:r>
           </a:p>
           <a:p>
@@ -5037,10 +5037,106 @@
                 <a:solidFill>
                   <a:srgbClr val="797979"/>
                 </a:solidFill>
-                <a:latin typeface="Helvetica"/>
-                <a:ea typeface="Helvetica"/>
-                <a:cs typeface="Helvetica"/>
-                <a:sym typeface="Helvetica"/>
+                <a:latin typeface="Montserrat"/>
+                <a:ea typeface="Montserrat"/>
+                <a:cs typeface="Montserrat"/>
+                <a:sym typeface="Montserrat"/>
+              </a:defRPr>
+            </a:pPr>
+            <a:r>
+              <a:t>Imageseller</a:t>
+            </a:r>
+          </a:p>
+          <a:p>
+            <a:pPr algn="l">
+              <a:defRPr spc="-48" sz="2400">
+                <a:solidFill>
+                  <a:srgbClr val="797979"/>
+                </a:solidFill>
+                <a:latin typeface="Montserrat"/>
+                <a:ea typeface="Montserrat"/>
+                <a:cs typeface="Montserrat"/>
+                <a:sym typeface="Montserrat"/>
+              </a:defRPr>
+            </a:pPr>
+            <a:r>
+              <a:t>Inkmonstr</a:t>
+            </a:r>
+          </a:p>
+          <a:p>
+            <a:pPr algn="l">
+              <a:defRPr spc="-48" sz="2400">
+                <a:solidFill>
+                  <a:srgbClr val="797979"/>
+                </a:solidFill>
+                <a:latin typeface="Montserrat"/>
+                <a:ea typeface="Montserrat"/>
+                <a:cs typeface="Montserrat"/>
+                <a:sym typeface="Montserrat"/>
+              </a:defRPr>
+            </a:pPr>
+            <a:r>
+              <a:t>Intelivideo</a:t>
+            </a:r>
+          </a:p>
+          <a:p>
+            <a:pPr algn="l">
+              <a:defRPr spc="-48" sz="2400">
+                <a:solidFill>
+                  <a:srgbClr val="797979"/>
+                </a:solidFill>
+                <a:latin typeface="Montserrat"/>
+                <a:ea typeface="Montserrat"/>
+                <a:cs typeface="Montserrat"/>
+                <a:sym typeface="Montserrat"/>
+              </a:defRPr>
+            </a:pPr>
+            <a:r>
+              <a:t>Nanno</a:t>
+            </a:r>
+          </a:p>
+          <a:p>
+            <a:pPr algn="l">
+              <a:defRPr spc="-48" sz="2400">
+                <a:solidFill>
+                  <a:srgbClr val="797979"/>
+                </a:solidFill>
+                <a:latin typeface="Montserrat"/>
+                <a:ea typeface="Montserrat"/>
+                <a:cs typeface="Montserrat"/>
+                <a:sym typeface="Montserrat"/>
+              </a:defRPr>
+            </a:pPr>
+            <a:r>
+              <a:t>Pass Gas Denver</a:t>
+            </a:r>
+          </a:p>
+          <a:p>
+            <a:pPr algn="l">
+              <a:defRPr spc="-48" sz="2400">
+                <a:solidFill>
+                  <a:srgbClr val="797979"/>
+                </a:solidFill>
+                <a:latin typeface="Montserrat"/>
+                <a:ea typeface="Montserrat"/>
+                <a:cs typeface="Montserrat"/>
+                <a:sym typeface="Montserrat"/>
+              </a:defRPr>
+            </a:pPr>
+            <a:r>
+              <a:t>Slalom</a:t>
+            </a:r>
+          </a:p>
+          <a:p>
+            <a:pPr algn="l">
+              <a:defRPr spc="-48" sz="2400">
+                <a:solidFill>
+                  <a:srgbClr val="797979"/>
+                </a:solidFill>
+                <a:latin typeface="Montserrat"/>
+                <a:ea typeface="Montserrat"/>
+                <a:cs typeface="Montserrat"/>
+                <a:sym typeface="Montserrat"/>
               </a:defRPr>
             </a:pPr>
             <a:r>
@@ -5112,10 +5208,10 @@
                 <a:solidFill>
                   <a:srgbClr val="797979"/>
                 </a:solidFill>
-                <a:latin typeface="Helvetica"/>
-                <a:ea typeface="Helvetica"/>
-                <a:cs typeface="Helvetica"/>
-                <a:sym typeface="Helvetica"/>
+                <a:latin typeface="Montserrat"/>
+                <a:ea typeface="Montserrat"/>
+                <a:cs typeface="Montserrat"/>
+                <a:sym typeface="Montserrat"/>
               </a:defRPr>
             </a:pPr>
             <a:r>
@@ -5128,14 +5224,14 @@
                 <a:solidFill>
                   <a:srgbClr val="797979"/>
                 </a:solidFill>
-                <a:latin typeface="Helvetica"/>
-                <a:ea typeface="Helvetica"/>
-                <a:cs typeface="Helvetica"/>
-                <a:sym typeface="Helvetica"/>
+                <a:latin typeface="Montserrat"/>
+                <a:ea typeface="Montserrat"/>
+                <a:cs typeface="Montserrat"/>
+                <a:sym typeface="Montserrat"/>
               </a:defRPr>
             </a:pPr>
             <a:r>
-              <a:t>Butler Snow</a:t>
+              <a:t>Bridgepoint Education</a:t>
             </a:r>
           </a:p>
           <a:p>
@@ -5144,14 +5240,14 @@
                 <a:solidFill>
                   <a:srgbClr val="797979"/>
                 </a:solidFill>
-                <a:latin typeface="Helvetica"/>
-                <a:ea typeface="Helvetica"/>
-                <a:cs typeface="Helvetica"/>
-                <a:sym typeface="Helvetica"/>
+                <a:latin typeface="Montserrat"/>
+                <a:ea typeface="Montserrat"/>
+                <a:cs typeface="Montserrat"/>
+                <a:sym typeface="Montserrat"/>
               </a:defRPr>
             </a:pPr>
             <a:r>
-              <a:t>Hogan Lovells</a:t>
+              <a:t>Butler Snow</a:t>
             </a:r>
           </a:p>
           <a:p>
@@ -5160,14 +5256,14 @@
                 <a:solidFill>
                   <a:srgbClr val="797979"/>
                 </a:solidFill>
-                <a:latin typeface="Helvetica"/>
-                <a:ea typeface="Helvetica"/>
-                <a:cs typeface="Helvetica"/>
-                <a:sym typeface="Helvetica"/>
+                <a:latin typeface="Montserrat"/>
+                <a:ea typeface="Montserrat"/>
+                <a:cs typeface="Montserrat"/>
+                <a:sym typeface="Montserrat"/>
               </a:defRPr>
             </a:pPr>
             <a:r>
-              <a:t>OneNeck IT</a:t>
+              <a:t>Delta Tables</a:t>
             </a:r>
           </a:p>
           <a:p>
@@ -5176,14 +5272,14 @@
                 <a:solidFill>
                   <a:srgbClr val="797979"/>
                 </a:solidFill>
-                <a:latin typeface="Helvetica"/>
-                <a:ea typeface="Helvetica"/>
-                <a:cs typeface="Helvetica"/>
-                <a:sym typeface="Helvetica"/>
+                <a:latin typeface="Montserrat"/>
+                <a:ea typeface="Montserrat"/>
+                <a:cs typeface="Montserrat"/>
+                <a:sym typeface="Montserrat"/>
               </a:defRPr>
             </a:pPr>
             <a:r>
-              <a:t>Slifer, Smith &amp; Frampton</a:t>
+              <a:t>Denver Foundation</a:t>
             </a:r>
           </a:p>
           <a:p>
@@ -5192,250 +5288,470 @@
                 <a:solidFill>
                   <a:srgbClr val="797979"/>
                 </a:solidFill>
-                <a:latin typeface="Helvetica"/>
-                <a:ea typeface="Helvetica"/>
-                <a:cs typeface="Helvetica"/>
-                <a:sym typeface="Helvetica"/>
+                <a:latin typeface="Montserrat"/>
+                <a:ea typeface="Montserrat"/>
+                <a:cs typeface="Montserrat"/>
+                <a:sym typeface="Montserrat"/>
               </a:defRPr>
             </a:pPr>
             <a:r>
+              <a:t>Hogan Lovells</a:t>
+            </a:r>
+          </a:p>
+          <a:p>
+            <a:pPr algn="l">
+              <a:defRPr spc="-48" sz="2400">
+                <a:solidFill>
+                  <a:srgbClr val="797979"/>
+                </a:solidFill>
+                <a:latin typeface="Montserrat"/>
+                <a:ea typeface="Montserrat"/>
+                <a:cs typeface="Montserrat"/>
+                <a:sym typeface="Montserrat"/>
+              </a:defRPr>
+            </a:pPr>
+            <a:r>
+              <a:t>Meyer Law</a:t>
+            </a:r>
+          </a:p>
+          <a:p>
+            <a:pPr algn="l">
+              <a:defRPr spc="-48" sz="2400">
+                <a:solidFill>
+                  <a:srgbClr val="797979"/>
+                </a:solidFill>
+                <a:latin typeface="Montserrat"/>
+                <a:ea typeface="Montserrat"/>
+                <a:cs typeface="Montserrat"/>
+                <a:sym typeface="Montserrat"/>
+              </a:defRPr>
+            </a:pPr>
+            <a:r>
+              <a:t>Name.com</a:t>
+            </a:r>
+          </a:p>
+          <a:p>
+            <a:pPr algn="l">
+              <a:defRPr spc="-48" sz="2400">
+                <a:solidFill>
+                  <a:srgbClr val="797979"/>
+                </a:solidFill>
+                <a:latin typeface="Montserrat"/>
+                <a:ea typeface="Montserrat"/>
+                <a:cs typeface="Montserrat"/>
+                <a:sym typeface="Montserrat"/>
+              </a:defRPr>
+            </a:pPr>
+            <a:r>
+              <a:t>Slifer, Smith &amp; Frampton</a:t>
+            </a:r>
+          </a:p>
+          <a:p>
+            <a:pPr algn="l">
+              <a:defRPr spc="-48" sz="2400">
+                <a:solidFill>
+                  <a:srgbClr val="797979"/>
+                </a:solidFill>
+                <a:latin typeface="Montserrat"/>
+                <a:ea typeface="Montserrat"/>
+                <a:cs typeface="Montserrat"/>
+                <a:sym typeface="Montserrat"/>
+              </a:defRPr>
+            </a:pPr>
+            <a:r>
+              <a:t>SoGnar</a:t>
+            </a:r>
+          </a:p>
+          <a:p>
+            <a:pPr algn="l">
+              <a:defRPr spc="-48" sz="2400">
+                <a:solidFill>
+                  <a:srgbClr val="797979"/>
+                </a:solidFill>
+                <a:latin typeface="Montserrat"/>
+                <a:ea typeface="Montserrat"/>
+                <a:cs typeface="Montserrat"/>
+                <a:sym typeface="Montserrat"/>
+              </a:defRPr>
+            </a:pPr>
+            <a:r>
               <a:t>Swiftpage</a:t>
+            </a:r>
+          </a:p>
+          <a:p>
+            <a:pPr algn="l">
+              <a:defRPr spc="-48" sz="2400">
+                <a:solidFill>
+                  <a:srgbClr val="797979"/>
+                </a:solidFill>
+                <a:latin typeface="Montserrat"/>
+                <a:ea typeface="Montserrat"/>
+                <a:cs typeface="Montserrat"/>
+                <a:sym typeface="Montserrat"/>
+              </a:defRPr>
+            </a:pPr>
+            <a:r>
+              <a:t>Zipcar</a:t>
             </a:r>
           </a:p>
         </p:txBody>
       </p:sp>
-      <p:pic>
-        <p:nvPicPr>
-          <p:cNvPr id="171" name="aarp-6c15d4fcb2a5ed35139da45c05448fc9384d1b109d85a1d7fdfbd50ee7be9823.png" descr="aarp-6c15d4fcb2a5ed35139da45c05448fc9384d1b109d85a1d7fdfbd50ee7be9823.png"/>
-          <p:cNvPicPr>
-            <a:picLocks noChangeAspect="1"/>
-          </p:cNvPicPr>
+      <p:grpSp>
+        <p:nvGrpSpPr>
+          <p:cNvPr id="182" name="Group"/>
+          <p:cNvGrpSpPr/>
           <p:nvPr/>
-        </p:nvPicPr>
-        <p:blipFill>
-          <a:blip r:embed="rId3">
-            <a:extLst/>
-          </a:blip>
-          <a:stretch>
-            <a:fillRect/>
-          </a:stretch>
-        </p:blipFill>
-        <p:spPr>
+        </p:nvGrpSpPr>
+        <p:grpSpPr>
           <a:xfrm>
-            <a:off x="1282700" y="2317766"/>
-            <a:ext cx="3175000" cy="503727"/>
+            <a:off x="1282699" y="1854200"/>
+            <a:ext cx="17780002" cy="2653150"/>
+            <a:chOff x="0" y="0"/>
+            <a:chExt cx="17780000" cy="2653149"/>
           </a:xfrm>
-          <a:prstGeom prst="rect">
-            <a:avLst/>
-          </a:prstGeom>
-          <a:ln w="12700">
-            <a:miter lim="400000"/>
-          </a:ln>
-        </p:spPr>
-      </p:pic>
-      <p:pic>
-        <p:nvPicPr>
-          <p:cNvPr id="172" name="Avnet_logo_tagline_rgb_copy.png" descr="Avnet_logo_tagline_rgb_copy.png"/>
-          <p:cNvPicPr>
-            <a:picLocks noChangeAspect="1"/>
-          </p:cNvPicPr>
-          <p:nvPr/>
-        </p:nvPicPr>
-        <p:blipFill>
-          <a:blip r:embed="rId4">
-            <a:extLst/>
-          </a:blip>
-          <a:stretch>
-            <a:fillRect/>
-          </a:stretch>
-        </p:blipFill>
-        <p:spPr>
-          <a:xfrm>
-            <a:off x="5837496" y="2136907"/>
-            <a:ext cx="3175001" cy="865445"/>
-          </a:xfrm>
-          <a:prstGeom prst="rect">
-            <a:avLst/>
-          </a:prstGeom>
-          <a:ln w="12700">
-            <a:miter lim="400000"/>
-          </a:ln>
-        </p:spPr>
-      </p:pic>
-      <p:pic>
-        <p:nvPicPr>
-          <p:cNvPr id="173" name="bold-legal-logo_copy.png" descr="bold-legal-logo_copy.png"/>
-          <p:cNvPicPr>
-            <a:picLocks noChangeAspect="1"/>
-          </p:cNvPicPr>
-          <p:nvPr/>
-        </p:nvPicPr>
-        <p:blipFill>
-          <a:blip r:embed="rId5">
-            <a:extLst/>
-          </a:blip>
-          <a:stretch>
-            <a:fillRect/>
-          </a:stretch>
-        </p:blipFill>
-        <p:spPr>
-          <a:xfrm>
-            <a:off x="14947090" y="2372472"/>
-            <a:ext cx="3175001" cy="394315"/>
-          </a:xfrm>
-          <a:prstGeom prst="rect">
-            <a:avLst/>
-          </a:prstGeom>
-          <a:ln w="12700">
-            <a:miter lim="400000"/>
-          </a:ln>
-        </p:spPr>
-      </p:pic>
-      <p:pic>
-        <p:nvPicPr>
-          <p:cNvPr id="174" name="xero.png" descr="xero.png"/>
-          <p:cNvPicPr>
-            <a:picLocks noChangeAspect="1"/>
-          </p:cNvPicPr>
-          <p:nvPr/>
-        </p:nvPicPr>
-        <p:blipFill>
-          <a:blip r:embed="rId6">
-            <a:extLst/>
-          </a:blip>
-          <a:stretch>
-            <a:fillRect/>
-          </a:stretch>
-        </p:blipFill>
-        <p:spPr>
-          <a:xfrm>
-            <a:off x="10392293" y="1850934"/>
-            <a:ext cx="3175001" cy="1564391"/>
-          </a:xfrm>
-          <a:prstGeom prst="rect">
-            <a:avLst/>
-          </a:prstGeom>
-          <a:ln w="12700">
-            <a:miter lim="400000"/>
-          </a:ln>
-        </p:spPr>
-      </p:pic>
-      <p:pic>
-        <p:nvPicPr>
-          <p:cNvPr id="175" name="Spectrum_Logo_DBlue_RGB_copy.png" descr="Spectrum_Logo_DBlue_RGB_copy.png"/>
-          <p:cNvPicPr>
-            <a:picLocks noChangeAspect="1"/>
-          </p:cNvPicPr>
-          <p:nvPr/>
-        </p:nvPicPr>
-        <p:blipFill>
-          <a:blip r:embed="rId7">
-            <a:extLst/>
-          </a:blip>
-          <a:stretch>
-            <a:fillRect/>
-          </a:stretch>
-        </p:blipFill>
-        <p:spPr>
-          <a:xfrm>
-            <a:off x="5416905" y="4050104"/>
-            <a:ext cx="3175001" cy="665727"/>
-          </a:xfrm>
-          <a:prstGeom prst="rect">
-            <a:avLst/>
-          </a:prstGeom>
-          <a:ln w="12700">
-            <a:miter lim="400000"/>
-          </a:ln>
-        </p:spPr>
-      </p:pic>
-      <p:pic>
-        <p:nvPicPr>
-          <p:cNvPr id="176" name="sendgrid-721203d3182321bd84a93ae1c4f7a20a0e3b4c0a2e685ad31e9b1ada204f66e1.png" descr="sendgrid-721203d3182321bd84a93ae1c4f7a20a0e3b4c0a2e685ad31e9b1ada204f66e1.png"/>
-          <p:cNvPicPr>
-            <a:picLocks noChangeAspect="1"/>
-          </p:cNvPicPr>
-          <p:nvPr/>
-        </p:nvPicPr>
-        <p:blipFill>
-          <a:blip r:embed="rId8">
-            <a:extLst/>
-          </a:blip>
-          <a:stretch>
-            <a:fillRect/>
-          </a:stretch>
-        </p:blipFill>
-        <p:spPr>
-          <a:xfrm>
-            <a:off x="10186111" y="4036370"/>
-            <a:ext cx="3175001" cy="693195"/>
-          </a:xfrm>
-          <a:prstGeom prst="rect">
-            <a:avLst/>
-          </a:prstGeom>
-          <a:ln w="12700">
-            <a:miter lim="400000"/>
-          </a:ln>
-        </p:spPr>
-      </p:pic>
-      <p:pic>
-        <p:nvPicPr>
-          <p:cNvPr id="177" name="Next50_copy.png" descr="Next50_copy.png"/>
-          <p:cNvPicPr>
-            <a:picLocks noChangeAspect="1"/>
-          </p:cNvPicPr>
-          <p:nvPr/>
-        </p:nvPicPr>
-        <p:blipFill>
-          <a:blip r:embed="rId9">
-            <a:extLst/>
-          </a:blip>
-          <a:stretch>
-            <a:fillRect/>
-          </a:stretch>
-        </p:blipFill>
-        <p:spPr>
-          <a:xfrm>
-            <a:off x="15646399" y="3457848"/>
-            <a:ext cx="1587501" cy="1859366"/>
-          </a:xfrm>
-          <a:prstGeom prst="rect">
-            <a:avLst/>
-          </a:prstGeom>
-          <a:ln w="12700">
-            <a:miter lim="400000"/>
-          </a:ln>
-        </p:spPr>
-      </p:pic>
-      <p:pic>
-        <p:nvPicPr>
-          <p:cNvPr id="178" name="Pear_logo_2_color.png" descr="Pear_logo_2_color.png"/>
-          <p:cNvPicPr>
-            <a:picLocks noChangeAspect="1"/>
-          </p:cNvPicPr>
-          <p:nvPr/>
-        </p:nvPicPr>
-        <p:blipFill>
-          <a:blip r:embed="rId10">
-            <a:extLst/>
-          </a:blip>
-          <a:stretch>
-            <a:fillRect/>
-          </a:stretch>
-        </p:blipFill>
-        <p:spPr>
-          <a:xfrm>
-            <a:off x="1282700" y="3849442"/>
-            <a:ext cx="3175000" cy="1067052"/>
-          </a:xfrm>
-          <a:prstGeom prst="rect">
-            <a:avLst/>
-          </a:prstGeom>
-          <a:ln w="12700">
-            <a:miter lim="400000"/>
-          </a:ln>
-        </p:spPr>
-      </p:pic>
+        </p:grpSpPr>
+        <p:pic>
+          <p:nvPicPr>
+            <p:cNvPr id="171" name="aarp-6c15d4fcb2a5ed35139da45c05448fc9384d1b109d85a1d7fdfbd50ee7be9823.png" descr="aarp-6c15d4fcb2a5ed35139da45c05448fc9384d1b109d85a1d7fdfbd50ee7be9823.png"/>
+            <p:cNvPicPr>
+              <a:picLocks noChangeAspect="1"/>
+            </p:cNvPicPr>
+            <p:nvPr/>
+          </p:nvPicPr>
+          <p:blipFill>
+            <a:blip r:embed="rId3">
+              <a:extLst/>
+            </a:blip>
+            <a:stretch>
+              <a:fillRect/>
+            </a:stretch>
+          </p:blipFill>
+          <p:spPr>
+            <a:xfrm>
+              <a:off x="0" y="324252"/>
+              <a:ext cx="2205291" cy="349878"/>
+            </a:xfrm>
+            <a:prstGeom prst="rect">
+              <a:avLst/>
+            </a:prstGeom>
+            <a:ln w="12700" cap="flat">
+              <a:noFill/>
+              <a:miter lim="400000"/>
+            </a:ln>
+            <a:effectLst/>
+          </p:spPr>
+        </p:pic>
+        <p:pic>
+          <p:nvPicPr>
+            <p:cNvPr id="172" name="Avnet_logo_tagline_rgb_copy.png" descr="Avnet_logo_tagline_rgb_copy.png"/>
+            <p:cNvPicPr>
+              <a:picLocks noChangeAspect="1"/>
+            </p:cNvPicPr>
+            <p:nvPr/>
+          </p:nvPicPr>
+          <p:blipFill>
+            <a:blip r:embed="rId4">
+              <a:extLst/>
+            </a:blip>
+            <a:stretch>
+              <a:fillRect/>
+            </a:stretch>
+          </p:blipFill>
+          <p:spPr>
+            <a:xfrm>
+              <a:off x="3163669" y="198631"/>
+              <a:ext cx="2205292" cy="601120"/>
+            </a:xfrm>
+            <a:prstGeom prst="rect">
+              <a:avLst/>
+            </a:prstGeom>
+            <a:ln w="12700" cap="flat">
+              <a:noFill/>
+              <a:miter lim="400000"/>
+            </a:ln>
+            <a:effectLst/>
+          </p:spPr>
+        </p:pic>
+        <p:pic>
+          <p:nvPicPr>
+            <p:cNvPr id="173" name="bold-legal-logo_copy.png" descr="bold-legal-logo_copy.png"/>
+            <p:cNvPicPr>
+              <a:picLocks noChangeAspect="1"/>
+            </p:cNvPicPr>
+            <p:nvPr/>
+          </p:nvPicPr>
+          <p:blipFill>
+            <a:blip r:embed="rId5">
+              <a:extLst/>
+            </a:blip>
+            <a:stretch>
+              <a:fillRect/>
+            </a:stretch>
+          </p:blipFill>
+          <p:spPr>
+            <a:xfrm>
+              <a:off x="9491009" y="362249"/>
+              <a:ext cx="2205292" cy="273884"/>
+            </a:xfrm>
+            <a:prstGeom prst="rect">
+              <a:avLst/>
+            </a:prstGeom>
+            <a:ln w="12700" cap="flat">
+              <a:noFill/>
+              <a:miter lim="400000"/>
+            </a:ln>
+            <a:effectLst/>
+          </p:spPr>
+        </p:pic>
+        <p:pic>
+          <p:nvPicPr>
+            <p:cNvPr id="174" name="xero.png" descr="xero.png"/>
+            <p:cNvPicPr>
+              <a:picLocks noChangeAspect="1"/>
+            </p:cNvPicPr>
+            <p:nvPr/>
+          </p:nvPicPr>
+          <p:blipFill>
+            <a:blip r:embed="rId6">
+              <a:extLst/>
+            </a:blip>
+            <a:stretch>
+              <a:fillRect/>
+            </a:stretch>
+          </p:blipFill>
+          <p:spPr>
+            <a:xfrm>
+              <a:off x="6327339" y="0"/>
+              <a:ext cx="2205292" cy="1086594"/>
+            </a:xfrm>
+            <a:prstGeom prst="rect">
+              <a:avLst/>
+            </a:prstGeom>
+            <a:ln w="12700" cap="flat">
+              <a:noFill/>
+              <a:miter lim="400000"/>
+            </a:ln>
+            <a:effectLst/>
+          </p:spPr>
+        </p:pic>
+        <p:pic>
+          <p:nvPicPr>
+            <p:cNvPr id="175" name="Spectrum_Logo_DBlue_RGB_copy.png" descr="Spectrum_Logo_DBlue_RGB_copy.png"/>
+            <p:cNvPicPr>
+              <a:picLocks noChangeAspect="1"/>
+            </p:cNvPicPr>
+            <p:nvPr/>
+          </p:nvPicPr>
+          <p:blipFill>
+            <a:blip r:embed="rId7">
+              <a:extLst/>
+            </a:blip>
+            <a:stretch>
+              <a:fillRect/>
+            </a:stretch>
+          </p:blipFill>
+          <p:spPr>
+            <a:xfrm>
+              <a:off x="2871535" y="1527499"/>
+              <a:ext cx="2205292" cy="462400"/>
+            </a:xfrm>
+            <a:prstGeom prst="rect">
+              <a:avLst/>
+            </a:prstGeom>
+            <a:ln w="12700" cap="flat">
+              <a:noFill/>
+              <a:miter lim="400000"/>
+            </a:ln>
+            <a:effectLst/>
+          </p:spPr>
+        </p:pic>
+        <p:pic>
+          <p:nvPicPr>
+            <p:cNvPr id="176" name="sendgrid-721203d3182321bd84a93ae1c4f7a20a0e3b4c0a2e685ad31e9b1ada204f66e1.png" descr="sendgrid-721203d3182321bd84a93ae1c4f7a20a0e3b4c0a2e685ad31e9b1ada204f66e1.png"/>
+            <p:cNvPicPr>
+              <a:picLocks noChangeAspect="1"/>
+            </p:cNvPicPr>
+            <p:nvPr/>
+          </p:nvPicPr>
+          <p:blipFill>
+            <a:blip r:embed="rId8">
+              <a:extLst/>
+            </a:blip>
+            <a:stretch>
+              <a:fillRect/>
+            </a:stretch>
+          </p:blipFill>
+          <p:spPr>
+            <a:xfrm>
+              <a:off x="6184129" y="1517959"/>
+              <a:ext cx="2205292" cy="481480"/>
+            </a:xfrm>
+            <a:prstGeom prst="rect">
+              <a:avLst/>
+            </a:prstGeom>
+            <a:ln w="12700" cap="flat">
+              <a:noFill/>
+              <a:miter lim="400000"/>
+            </a:ln>
+            <a:effectLst/>
+          </p:spPr>
+        </p:pic>
+        <p:pic>
+          <p:nvPicPr>
+            <p:cNvPr id="177" name="Next50_copy.png" descr="Next50_copy.png"/>
+            <p:cNvPicPr>
+              <a:picLocks noChangeAspect="1"/>
+            </p:cNvPicPr>
+            <p:nvPr/>
+          </p:nvPicPr>
+          <p:blipFill>
+            <a:blip r:embed="rId9">
+              <a:extLst/>
+            </a:blip>
+            <a:stretch>
+              <a:fillRect/>
+            </a:stretch>
+          </p:blipFill>
+          <p:spPr>
+            <a:xfrm>
+              <a:off x="9976736" y="1116129"/>
+              <a:ext cx="1102646" cy="1291479"/>
+            </a:xfrm>
+            <a:prstGeom prst="rect">
+              <a:avLst/>
+            </a:prstGeom>
+            <a:ln w="12700" cap="flat">
+              <a:noFill/>
+              <a:miter lim="400000"/>
+            </a:ln>
+            <a:effectLst/>
+          </p:spPr>
+        </p:pic>
+        <p:pic>
+          <p:nvPicPr>
+            <p:cNvPr id="178" name="Pear_logo_2_color.png" descr="Pear_logo_2_color.png"/>
+            <p:cNvPicPr>
+              <a:picLocks noChangeAspect="1"/>
+            </p:cNvPicPr>
+            <p:nvPr/>
+          </p:nvPicPr>
+          <p:blipFill>
+            <a:blip r:embed="rId10">
+              <a:extLst/>
+            </a:blip>
+            <a:stretch>
+              <a:fillRect/>
+            </a:stretch>
+          </p:blipFill>
+          <p:spPr>
+            <a:xfrm>
+              <a:off x="0" y="1388122"/>
+              <a:ext cx="2205291" cy="741154"/>
+            </a:xfrm>
+            <a:prstGeom prst="rect">
+              <a:avLst/>
+            </a:prstGeom>
+            <a:ln w="12700" cap="flat">
+              <a:noFill/>
+              <a:miter lim="400000"/>
+            </a:ln>
+            <a:effectLst/>
+          </p:spPr>
+        </p:pic>
+        <p:pic>
+          <p:nvPicPr>
+            <p:cNvPr id="179" name="cablecenter-73afaea71fc8f583129be88ac402483ea4ea1ab7fd7d3d0a9e759407844e64b2.png" descr="cablecenter-73afaea71fc8f583129be88ac402483ea4ea1ab7fd7d3d0a9e759407844e64b2.png"/>
+            <p:cNvPicPr>
+              <a:picLocks noChangeAspect="1"/>
+            </p:cNvPicPr>
+            <p:nvPr/>
+          </p:nvPicPr>
+          <p:blipFill>
+            <a:blip r:embed="rId11">
+              <a:extLst/>
+            </a:blip>
+            <a:stretch>
+              <a:fillRect/>
+            </a:stretch>
+          </p:blipFill>
+          <p:spPr>
+            <a:xfrm>
+              <a:off x="12654679" y="337106"/>
+              <a:ext cx="2198666" cy="293156"/>
+            </a:xfrm>
+            <a:prstGeom prst="rect">
+              <a:avLst/>
+            </a:prstGeom>
+            <a:ln w="12700" cap="flat">
+              <a:noFill/>
+              <a:miter lim="400000"/>
+            </a:ln>
+            <a:effectLst/>
+          </p:spPr>
+        </p:pic>
+        <p:pic>
+          <p:nvPicPr>
+            <p:cNvPr id="180" name="xite-8ed23b927eb03cc6066481e9fa6333948e67ae3a1292fe5941ccee033c0cbfc0.png" descr="xite-8ed23b927eb03cc6066481e9fa6333948e67ae3a1292fe5941ccee033c0cbfc0.png"/>
+            <p:cNvPicPr>
+              <a:picLocks noChangeAspect="1"/>
+            </p:cNvPicPr>
+            <p:nvPr/>
+          </p:nvPicPr>
+          <p:blipFill>
+            <a:blip r:embed="rId12">
+              <a:extLst/>
+            </a:blip>
+            <a:stretch>
+              <a:fillRect/>
+            </a:stretch>
+          </p:blipFill>
+          <p:spPr>
+            <a:xfrm>
+              <a:off x="12995749" y="1103797"/>
+              <a:ext cx="2198666" cy="1549353"/>
+            </a:xfrm>
+            <a:prstGeom prst="rect">
+              <a:avLst/>
+            </a:prstGeom>
+            <a:ln w="12700" cap="flat">
+              <a:noFill/>
+              <a:miter lim="400000"/>
+            </a:ln>
+            <a:effectLst/>
+          </p:spPr>
+        </p:pic>
+        <p:pic>
+          <p:nvPicPr>
+            <p:cNvPr id="181" name="Molson_Coors__Converted__copy.png" descr="Molson_Coors__Converted__copy.png"/>
+            <p:cNvPicPr>
+              <a:picLocks noChangeAspect="1"/>
+            </p:cNvPicPr>
+            <p:nvPr/>
+          </p:nvPicPr>
+          <p:blipFill>
+            <a:blip r:embed="rId13">
+              <a:extLst/>
+            </a:blip>
+            <a:stretch>
+              <a:fillRect/>
+            </a:stretch>
+          </p:blipFill>
+          <p:spPr>
+            <a:xfrm>
+              <a:off x="15584387" y="187492"/>
+              <a:ext cx="2195614" cy="623398"/>
+            </a:xfrm>
+            <a:prstGeom prst="rect">
+              <a:avLst/>
+            </a:prstGeom>
+            <a:ln w="12700" cap="flat">
+              <a:noFill/>
+              <a:miter lim="400000"/>
+            </a:ln>
+            <a:effectLst/>
+          </p:spPr>
+        </p:pic>
+      </p:grpSp>
     </p:spTree>
   </p:cSld>
   <p:clrMapOvr>

</xml_diff>

<commit_message>
One more logo update
</commit_message>
<xml_diff>
--- a/public/media_assets/DSW17_TEMPLATE 16_9.pptx
+++ b/public/media_assets/DSW17_TEMPLATE 16_9.pptx
@@ -4091,10 +4091,10 @@
         </p:nvGrpSpPr>
         <p:grpSpPr>
           <a:xfrm>
-            <a:off x="1371599" y="8555335"/>
-            <a:ext cx="14122525" cy="2921001"/>
-            <a:chOff x="42245" y="447217"/>
-            <a:chExt cx="14122523" cy="2921000"/>
+            <a:off x="1371600" y="8377535"/>
+            <a:ext cx="15240000" cy="3152131"/>
+            <a:chOff x="45588" y="482604"/>
+            <a:chExt cx="15239999" cy="3152130"/>
           </a:xfrm>
         </p:grpSpPr>
         <p:pic>
@@ -4117,8 +4117,8 @@
           </p:blipFill>
           <p:spPr>
             <a:xfrm>
-              <a:off x="42245" y="2245456"/>
-              <a:ext cx="3738150" cy="966168"/>
+              <a:off x="45588" y="2423133"/>
+              <a:ext cx="4033939" cy="1042618"/>
             </a:xfrm>
             <a:prstGeom prst="rect">
               <a:avLst/>
@@ -4148,8 +4148,8 @@
           </p:blipFill>
           <p:spPr>
             <a:xfrm>
-              <a:off x="42245" y="785169"/>
-              <a:ext cx="3846004" cy="589449"/>
+              <a:off x="45588" y="847297"/>
+              <a:ext cx="4150328" cy="636091"/>
             </a:xfrm>
             <a:prstGeom prst="rect">
               <a:avLst/>
@@ -4179,8 +4179,8 @@
           </p:blipFill>
           <p:spPr>
             <a:xfrm>
-              <a:off x="5180505" y="447217"/>
-              <a:ext cx="3846004" cy="1265353"/>
+              <a:off x="5590425" y="482604"/>
+              <a:ext cx="4150327" cy="1365477"/>
             </a:xfrm>
             <a:prstGeom prst="rect">
               <a:avLst/>
@@ -4210,8 +4210,8 @@
           </p:blipFill>
           <p:spPr>
             <a:xfrm>
-              <a:off x="10318766" y="639843"/>
-              <a:ext cx="3846004" cy="880101"/>
+              <a:off x="11135262" y="690472"/>
+              <a:ext cx="4150327" cy="949741"/>
             </a:xfrm>
             <a:prstGeom prst="rect">
               <a:avLst/>
@@ -4241,8 +4241,8 @@
           </p:blipFill>
           <p:spPr>
             <a:xfrm>
-              <a:off x="5334526" y="2089003"/>
-              <a:ext cx="3461403" cy="1279215"/>
+              <a:off x="5756632" y="2254300"/>
+              <a:ext cx="3735295" cy="1380436"/>
             </a:xfrm>
             <a:prstGeom prst="rect">
               <a:avLst/>
@@ -4272,8 +4272,8 @@
           </p:blipFill>
           <p:spPr>
             <a:xfrm>
-              <a:off x="10296050" y="2423518"/>
-              <a:ext cx="3846004" cy="610185"/>
+              <a:off x="11110749" y="2615285"/>
+              <a:ext cx="4150327" cy="658466"/>
             </a:xfrm>
             <a:prstGeom prst="rect">
               <a:avLst/>
@@ -4323,10 +4323,10 @@
         </p:nvGrpSpPr>
         <p:grpSpPr>
           <a:xfrm>
-            <a:off x="1334339" y="2540729"/>
-            <a:ext cx="13927940" cy="2917342"/>
+            <a:off x="1334339" y="2439129"/>
+            <a:ext cx="16510001" cy="3458179"/>
             <a:chOff x="0" y="0"/>
-            <a:chExt cx="13927938" cy="2917340"/>
+            <a:chExt cx="16510000" cy="3458178"/>
           </a:xfrm>
         </p:grpSpPr>
         <p:pic>
@@ -4348,8 +4348,8 @@
           </p:blipFill>
           <p:spPr>
             <a:xfrm>
-              <a:off x="5536961" y="195402"/>
-              <a:ext cx="2859731" cy="1000907"/>
+              <a:off x="6563442" y="231628"/>
+              <a:ext cx="3389889" cy="1186461"/>
             </a:xfrm>
             <a:prstGeom prst="rect">
               <a:avLst/>
@@ -4380,8 +4380,8 @@
           </p:blipFill>
           <p:spPr>
             <a:xfrm>
-              <a:off x="10250652" y="0"/>
-              <a:ext cx="3677287" cy="1391712"/>
+              <a:off x="12150992" y="0"/>
+              <a:ext cx="4359008" cy="1649717"/>
             </a:xfrm>
             <a:prstGeom prst="rect">
               <a:avLst/>
@@ -4412,8 +4412,8 @@
           </p:blipFill>
           <p:spPr>
             <a:xfrm>
-              <a:off x="2955707" y="1886765"/>
-              <a:ext cx="3294461" cy="1030576"/>
+              <a:off x="3503657" y="2236548"/>
+              <a:ext cx="3905212" cy="1221631"/>
             </a:xfrm>
             <a:prstGeom prst="rect">
               <a:avLst/>
@@ -4443,8 +4443,8 @@
           </p:blipFill>
           <p:spPr>
             <a:xfrm>
-              <a:off x="7598850" y="1827024"/>
-              <a:ext cx="3683001" cy="822235"/>
+              <a:off x="9007579" y="2165731"/>
+              <a:ext cx="4365782" cy="974666"/>
             </a:xfrm>
             <a:prstGeom prst="rect">
               <a:avLst/>
@@ -4474,8 +4474,8 @@
           </p:blipFill>
           <p:spPr>
             <a:xfrm>
-              <a:off x="0" y="303046"/>
-              <a:ext cx="3683000" cy="1025166"/>
+              <a:off x="0" y="359227"/>
+              <a:ext cx="4365782" cy="1215218"/>
             </a:xfrm>
             <a:prstGeom prst="rect">
               <a:avLst/>
@@ -5404,8 +5404,8 @@
         </p:nvGrpSpPr>
         <p:grpSpPr>
           <a:xfrm>
-            <a:off x="1282699" y="1854200"/>
-            <a:ext cx="17780002" cy="2653150"/>
+            <a:off x="1282700" y="2324100"/>
+            <a:ext cx="17780001" cy="2653150"/>
             <a:chOff x="0" y="0"/>
             <a:chExt cx="17780000" cy="2653149"/>
           </a:xfrm>
@@ -5614,8 +5614,8 @@
           </p:blipFill>
           <p:spPr>
             <a:xfrm>
-              <a:off x="9976736" y="1116129"/>
-              <a:ext cx="1102646" cy="1291479"/>
+              <a:off x="9976735" y="1116129"/>
+              <a:ext cx="1102647" cy="1291479"/>
             </a:xfrm>
             <a:prstGeom prst="rect">
               <a:avLst/>
@@ -5738,8 +5738,8 @@
           </p:blipFill>
           <p:spPr>
             <a:xfrm>
-              <a:off x="15584387" y="187492"/>
-              <a:ext cx="2195614" cy="623398"/>
+              <a:off x="15584388" y="187492"/>
+              <a:ext cx="2195613" cy="623398"/>
             </a:xfrm>
             <a:prstGeom prst="rect">
               <a:avLst/>

</xml_diff>

<commit_message>
Update slide deck templates
</commit_message>
<xml_diff>
--- a/public/media_assets/DSW17_TEMPLATE 16_9.pptx
+++ b/public/media_assets/DSW17_TEMPLATE 16_9.pptx
@@ -517,7 +517,7 @@
       <p:sp>
         <p:nvSpPr>
           <p:cNvPr id="11" name="Title Text"/>
-          <p:cNvSpPr txBox="1"/>
+          <p:cNvSpPr/>
           <p:nvPr>
             <p:ph type="title"/>
           </p:nvPr>
@@ -545,7 +545,7 @@
       <p:sp>
         <p:nvSpPr>
           <p:cNvPr id="12" name="Body Level One…"/>
-          <p:cNvSpPr txBox="1"/>
+          <p:cNvSpPr/>
           <p:nvPr>
             <p:ph type="body" sz="quarter" idx="1"/>
           </p:nvPr>
@@ -638,7 +638,7 @@
       <p:sp>
         <p:nvSpPr>
           <p:cNvPr id="13" name="Slide Number"/>
-          <p:cNvSpPr txBox="1"/>
+          <p:cNvSpPr/>
           <p:nvPr>
             <p:ph type="sldNum" sz="quarter" idx="2"/>
           </p:nvPr>
@@ -686,7 +686,7 @@
       <p:sp>
         <p:nvSpPr>
           <p:cNvPr id="93" name="–Johnny Appleseed"/>
-          <p:cNvSpPr txBox="1"/>
+          <p:cNvSpPr/>
           <p:nvPr>
             <p:ph type="body" sz="quarter" idx="13"/>
           </p:nvPr>
@@ -730,7 +730,7 @@
       <p:sp>
         <p:nvSpPr>
           <p:cNvPr id="94" name="“Type a quote here.”"/>
-          <p:cNvSpPr txBox="1"/>
+          <p:cNvSpPr/>
           <p:nvPr>
             <p:ph type="body" sz="quarter" idx="14"/>
           </p:nvPr>
@@ -768,7 +768,7 @@
       <p:sp>
         <p:nvSpPr>
           <p:cNvPr id="95" name="Slide Number"/>
-          <p:cNvSpPr txBox="1"/>
+          <p:cNvSpPr/>
           <p:nvPr>
             <p:ph type="sldNum" sz="quarter" idx="2"/>
           </p:nvPr>
@@ -843,7 +843,7 @@
       <p:sp>
         <p:nvSpPr>
           <p:cNvPr id="103" name="Slide Number"/>
-          <p:cNvSpPr txBox="1"/>
+          <p:cNvSpPr/>
           <p:nvPr>
             <p:ph type="sldNum" sz="quarter" idx="2"/>
           </p:nvPr>
@@ -891,7 +891,7 @@
       <p:sp>
         <p:nvSpPr>
           <p:cNvPr id="110" name="Slide Number"/>
-          <p:cNvSpPr txBox="1"/>
+          <p:cNvSpPr/>
           <p:nvPr>
             <p:ph type="sldNum" sz="quarter" idx="2"/>
           </p:nvPr>
@@ -966,7 +966,7 @@
       <p:sp>
         <p:nvSpPr>
           <p:cNvPr id="21" name="Title Text"/>
-          <p:cNvSpPr txBox="1"/>
+          <p:cNvSpPr/>
           <p:nvPr>
             <p:ph type="title"/>
           </p:nvPr>
@@ -994,7 +994,7 @@
       <p:sp>
         <p:nvSpPr>
           <p:cNvPr id="22" name="Body Level One…"/>
-          <p:cNvSpPr txBox="1"/>
+          <p:cNvSpPr/>
           <p:nvPr>
             <p:ph type="body" sz="quarter" idx="1"/>
           </p:nvPr>
@@ -1087,7 +1087,7 @@
       <p:sp>
         <p:nvSpPr>
           <p:cNvPr id="23" name="Slide Number"/>
-          <p:cNvSpPr txBox="1"/>
+          <p:cNvSpPr/>
           <p:nvPr>
             <p:ph type="sldNum" sz="quarter" idx="2"/>
           </p:nvPr>
@@ -1135,7 +1135,7 @@
       <p:sp>
         <p:nvSpPr>
           <p:cNvPr id="30" name="Title Text"/>
-          <p:cNvSpPr txBox="1"/>
+          <p:cNvSpPr/>
           <p:nvPr>
             <p:ph type="title"/>
           </p:nvPr>
@@ -1163,7 +1163,7 @@
       <p:sp>
         <p:nvSpPr>
           <p:cNvPr id="31" name="Slide Number"/>
-          <p:cNvSpPr txBox="1"/>
+          <p:cNvSpPr/>
           <p:nvPr>
             <p:ph type="sldNum" sz="quarter" idx="2"/>
           </p:nvPr>
@@ -1238,7 +1238,7 @@
       <p:sp>
         <p:nvSpPr>
           <p:cNvPr id="39" name="Title Text"/>
-          <p:cNvSpPr txBox="1"/>
+          <p:cNvSpPr/>
           <p:nvPr>
             <p:ph type="title"/>
           </p:nvPr>
@@ -1270,7 +1270,7 @@
       <p:sp>
         <p:nvSpPr>
           <p:cNvPr id="40" name="Body Level One…"/>
-          <p:cNvSpPr txBox="1"/>
+          <p:cNvSpPr/>
           <p:nvPr>
             <p:ph type="body" sz="quarter" idx="1"/>
           </p:nvPr>
@@ -1363,7 +1363,7 @@
       <p:sp>
         <p:nvSpPr>
           <p:cNvPr id="41" name="Slide Number"/>
-          <p:cNvSpPr txBox="1"/>
+          <p:cNvSpPr/>
           <p:nvPr>
             <p:ph type="sldNum" sz="quarter" idx="2"/>
           </p:nvPr>
@@ -1411,7 +1411,7 @@
       <p:sp>
         <p:nvSpPr>
           <p:cNvPr id="48" name="Title Text"/>
-          <p:cNvSpPr txBox="1"/>
+          <p:cNvSpPr/>
           <p:nvPr>
             <p:ph type="title"/>
           </p:nvPr>
@@ -1435,7 +1435,7 @@
       <p:sp>
         <p:nvSpPr>
           <p:cNvPr id="49" name="Slide Number"/>
-          <p:cNvSpPr txBox="1"/>
+          <p:cNvSpPr/>
           <p:nvPr>
             <p:ph type="sldNum" sz="quarter" idx="2"/>
           </p:nvPr>
@@ -1483,7 +1483,7 @@
       <p:sp>
         <p:nvSpPr>
           <p:cNvPr id="56" name="Title Text"/>
-          <p:cNvSpPr txBox="1"/>
+          <p:cNvSpPr/>
           <p:nvPr>
             <p:ph type="title"/>
           </p:nvPr>
@@ -1507,7 +1507,7 @@
       <p:sp>
         <p:nvSpPr>
           <p:cNvPr id="57" name="Body Level One…"/>
-          <p:cNvSpPr txBox="1"/>
+          <p:cNvSpPr/>
           <p:nvPr>
             <p:ph type="body" idx="1"/>
           </p:nvPr>
@@ -1555,7 +1555,7 @@
       <p:sp>
         <p:nvSpPr>
           <p:cNvPr id="58" name="Slide Number"/>
-          <p:cNvSpPr txBox="1"/>
+          <p:cNvSpPr/>
           <p:nvPr>
             <p:ph type="sldNum" sz="quarter" idx="2"/>
           </p:nvPr>
@@ -1630,7 +1630,7 @@
       <p:sp>
         <p:nvSpPr>
           <p:cNvPr id="66" name="Title Text"/>
-          <p:cNvSpPr txBox="1"/>
+          <p:cNvSpPr/>
           <p:nvPr>
             <p:ph type="title"/>
           </p:nvPr>
@@ -1654,7 +1654,7 @@
       <p:sp>
         <p:nvSpPr>
           <p:cNvPr id="67" name="Body Level One…"/>
-          <p:cNvSpPr txBox="1"/>
+          <p:cNvSpPr/>
           <p:nvPr>
             <p:ph type="body" sz="half" idx="1"/>
           </p:nvPr>
@@ -1737,7 +1737,7 @@
       <p:sp>
         <p:nvSpPr>
           <p:cNvPr id="68" name="Slide Number"/>
-          <p:cNvSpPr txBox="1"/>
+          <p:cNvSpPr/>
           <p:nvPr>
             <p:ph type="sldNum" sz="quarter" idx="2"/>
           </p:nvPr>
@@ -1785,7 +1785,7 @@
       <p:sp>
         <p:nvSpPr>
           <p:cNvPr id="75" name="Body Level One…"/>
-          <p:cNvSpPr txBox="1"/>
+          <p:cNvSpPr/>
           <p:nvPr>
             <p:ph type="body" idx="1"/>
           </p:nvPr>
@@ -1837,7 +1837,7 @@
       <p:sp>
         <p:nvSpPr>
           <p:cNvPr id="76" name="Slide Number"/>
-          <p:cNvSpPr txBox="1"/>
+          <p:cNvSpPr/>
           <p:nvPr>
             <p:ph type="sldNum" sz="quarter" idx="2"/>
           </p:nvPr>
@@ -1966,7 +1966,7 @@
       <p:sp>
         <p:nvSpPr>
           <p:cNvPr id="86" name="Slide Number"/>
-          <p:cNvSpPr txBox="1"/>
+          <p:cNvSpPr/>
           <p:nvPr>
             <p:ph type="sldNum" sz="quarter" idx="2"/>
           </p:nvPr>
@@ -2021,7 +2021,7 @@
       <p:sp>
         <p:nvSpPr>
           <p:cNvPr id="2" name="Title Text"/>
-          <p:cNvSpPr txBox="1"/>
+          <p:cNvSpPr/>
           <p:nvPr>
             <p:ph type="title"/>
           </p:nvPr>
@@ -2059,7 +2059,7 @@
       <p:sp>
         <p:nvSpPr>
           <p:cNvPr id="3" name="Body Level One…"/>
-          <p:cNvSpPr txBox="1"/>
+          <p:cNvSpPr/>
           <p:nvPr>
             <p:ph type="body" idx="1"/>
           </p:nvPr>
@@ -2121,7 +2121,7 @@
       <p:sp>
         <p:nvSpPr>
           <p:cNvPr id="4" name="Slide Number"/>
-          <p:cNvSpPr txBox="1"/>
+          <p:cNvSpPr/>
           <p:nvPr>
             <p:ph type="sldNum" sz="quarter" idx="2"/>
           </p:nvPr>
@@ -3109,7 +3109,7 @@
       <p:sp>
         <p:nvSpPr>
           <p:cNvPr id="123" name="TITLE of PRESENTATION"/>
-          <p:cNvSpPr txBox="1"/>
+          <p:cNvSpPr/>
           <p:nvPr/>
         </p:nvSpPr>
         <p:spPr>
@@ -3139,10 +3139,10 @@
                 <a:solidFill>
                   <a:srgbClr val="53585F"/>
                 </a:solidFill>
-                <a:latin typeface="Montserrat"/>
-                <a:ea typeface="Montserrat"/>
-                <a:cs typeface="Montserrat"/>
-                <a:sym typeface="Montserrat"/>
+                <a:latin typeface="Montserrat Light"/>
+                <a:ea typeface="Montserrat Light"/>
+                <a:cs typeface="Montserrat Light"/>
+                <a:sym typeface="Montserrat Light"/>
               </a:defRPr>
             </a:lvl1pPr>
           </a:lstStyle>
@@ -3157,7 +3157,7 @@
       <p:sp>
         <p:nvSpPr>
           <p:cNvPr id="124" name="Person Namehere…"/>
-          <p:cNvSpPr txBox="1"/>
+          <p:cNvSpPr/>
           <p:nvPr/>
         </p:nvSpPr>
         <p:spPr>
@@ -3191,10 +3191,10 @@
                 <a:solidFill>
                   <a:srgbClr val="4FE4E7"/>
                 </a:solidFill>
-                <a:latin typeface="Montserrat-Light"/>
-                <a:ea typeface="Montserrat-Light"/>
-                <a:cs typeface="Montserrat-Light"/>
-                <a:sym typeface="Montserrat-Light"/>
+                <a:latin typeface="Montserrat Light"/>
+                <a:ea typeface="Montserrat Light"/>
+                <a:cs typeface="Montserrat Light"/>
+                <a:sym typeface="Montserrat Light"/>
               </a:defRPr>
             </a:pPr>
             <a:r>
@@ -3210,10 +3210,10 @@
                 <a:solidFill>
                   <a:srgbClr val="4FE4E7"/>
                 </a:solidFill>
-                <a:latin typeface="Montserrat-Light"/>
-                <a:ea typeface="Montserrat-Light"/>
-                <a:cs typeface="Montserrat-Light"/>
-                <a:sym typeface="Montserrat-Light"/>
+                <a:latin typeface="Montserrat Light"/>
+                <a:ea typeface="Montserrat Light"/>
+                <a:cs typeface="Montserrat Light"/>
+                <a:sym typeface="Montserrat Light"/>
               </a:defRPr>
             </a:pPr>
             <a:r>
@@ -3338,7 +3338,7 @@
       <p:sp>
         <p:nvSpPr>
           <p:cNvPr id="129" name="Headline Text"/>
-          <p:cNvSpPr txBox="1"/>
+          <p:cNvSpPr/>
           <p:nvPr/>
         </p:nvSpPr>
         <p:spPr>
@@ -3368,10 +3368,10 @@
                 <a:solidFill>
                   <a:srgbClr val="53585F"/>
                 </a:solidFill>
-                <a:latin typeface="Montserrat"/>
-                <a:ea typeface="Montserrat"/>
-                <a:cs typeface="Montserrat"/>
-                <a:sym typeface="Montserrat"/>
+                <a:latin typeface="Montserrat Light"/>
+                <a:ea typeface="Montserrat Light"/>
+                <a:cs typeface="Montserrat Light"/>
+                <a:sym typeface="Montserrat Light"/>
               </a:defRPr>
             </a:lvl1pPr>
           </a:lstStyle>
@@ -3386,7 +3386,7 @@
       <p:sp>
         <p:nvSpPr>
           <p:cNvPr id="130" name="Lorem ipsum dolere sit met nonummy consecuter es quid. Lorem ipsum dolere sit met nonummy consecuter es quid. Lorem ipsum dolere sit met nonummy consecuter es quid. Lorem ipsum dolere sit met nonummy consecuter es quid."/>
-          <p:cNvSpPr txBox="1"/>
+          <p:cNvSpPr/>
           <p:nvPr/>
         </p:nvSpPr>
         <p:spPr>
@@ -3416,10 +3416,10 @@
                 <a:solidFill>
                   <a:srgbClr val="797979"/>
                 </a:solidFill>
-                <a:latin typeface="Montserrat"/>
-                <a:ea typeface="Montserrat"/>
-                <a:cs typeface="Montserrat"/>
-                <a:sym typeface="Montserrat"/>
+                <a:latin typeface="Montserrat Light"/>
+                <a:ea typeface="Montserrat Light"/>
+                <a:cs typeface="Montserrat Light"/>
+                <a:sym typeface="Montserrat Light"/>
               </a:defRPr>
             </a:lvl1pPr>
           </a:lstStyle>
@@ -3518,7 +3518,7 @@
       <p:sp>
         <p:nvSpPr>
           <p:cNvPr id="134" name="Headline Text"/>
-          <p:cNvSpPr txBox="1"/>
+          <p:cNvSpPr/>
           <p:nvPr/>
         </p:nvSpPr>
         <p:spPr>
@@ -3548,10 +3548,10 @@
                 <a:solidFill>
                   <a:srgbClr val="53585F"/>
                 </a:solidFill>
-                <a:latin typeface="Montserrat"/>
-                <a:ea typeface="Montserrat"/>
-                <a:cs typeface="Montserrat"/>
-                <a:sym typeface="Montserrat"/>
+                <a:latin typeface="Montserrat Light"/>
+                <a:ea typeface="Montserrat Light"/>
+                <a:cs typeface="Montserrat Light"/>
+                <a:sym typeface="Montserrat Light"/>
               </a:defRPr>
             </a:lvl1pPr>
           </a:lstStyle>
@@ -3566,7 +3566,7 @@
       <p:sp>
         <p:nvSpPr>
           <p:cNvPr id="135" name="Bullet ipsum dolor sit amet nonummy consecuter…"/>
-          <p:cNvSpPr txBox="1"/>
+          <p:cNvSpPr/>
           <p:nvPr/>
         </p:nvSpPr>
         <p:spPr>
@@ -3605,10 +3605,10 @@
                 <a:solidFill>
                   <a:srgbClr val="797979"/>
                 </a:solidFill>
-                <a:latin typeface="Montserrat"/>
-                <a:ea typeface="Montserrat"/>
-                <a:cs typeface="Montserrat"/>
-                <a:sym typeface="Montserrat"/>
+                <a:latin typeface="Montserrat Light"/>
+                <a:ea typeface="Montserrat Light"/>
+                <a:cs typeface="Montserrat Light"/>
+                <a:sym typeface="Montserrat Light"/>
               </a:defRPr>
             </a:pPr>
             <a:r>
@@ -3629,10 +3629,10 @@
                 <a:solidFill>
                   <a:srgbClr val="797979"/>
                 </a:solidFill>
-                <a:latin typeface="Montserrat"/>
-                <a:ea typeface="Montserrat"/>
-                <a:cs typeface="Montserrat"/>
-                <a:sym typeface="Montserrat"/>
+                <a:latin typeface="Montserrat Light"/>
+                <a:ea typeface="Montserrat Light"/>
+                <a:cs typeface="Montserrat Light"/>
+                <a:sym typeface="Montserrat Light"/>
               </a:defRPr>
             </a:pPr>
             <a:r>
@@ -3653,10 +3653,10 @@
                 <a:solidFill>
                   <a:srgbClr val="797979"/>
                 </a:solidFill>
-                <a:latin typeface="Montserrat"/>
-                <a:ea typeface="Montserrat"/>
-                <a:cs typeface="Montserrat"/>
-                <a:sym typeface="Montserrat"/>
+                <a:latin typeface="Montserrat Light"/>
+                <a:ea typeface="Montserrat Light"/>
+                <a:cs typeface="Montserrat Light"/>
+                <a:sym typeface="Montserrat Light"/>
               </a:defRPr>
             </a:pPr>
             <a:r>
@@ -3677,10 +3677,10 @@
                 <a:solidFill>
                   <a:srgbClr val="797979"/>
                 </a:solidFill>
-                <a:latin typeface="Montserrat"/>
-                <a:ea typeface="Montserrat"/>
-                <a:cs typeface="Montserrat"/>
-                <a:sym typeface="Montserrat"/>
+                <a:latin typeface="Montserrat Light"/>
+                <a:ea typeface="Montserrat Light"/>
+                <a:cs typeface="Montserrat Light"/>
+                <a:sym typeface="Montserrat Light"/>
               </a:defRPr>
             </a:pPr>
             <a:r>
@@ -3776,7 +3776,7 @@
       <p:sp>
         <p:nvSpPr>
           <p:cNvPr id="139" name="Headline Text"/>
-          <p:cNvSpPr txBox="1"/>
+          <p:cNvSpPr/>
           <p:nvPr/>
         </p:nvSpPr>
         <p:spPr>
@@ -3806,10 +3806,10 @@
                 <a:solidFill>
                   <a:srgbClr val="53585F"/>
                 </a:solidFill>
-                <a:latin typeface="Montserrat"/>
-                <a:ea typeface="Montserrat"/>
-                <a:cs typeface="Montserrat"/>
-                <a:sym typeface="Montserrat"/>
+                <a:latin typeface="Montserrat Light"/>
+                <a:ea typeface="Montserrat Light"/>
+                <a:cs typeface="Montserrat Light"/>
+                <a:sym typeface="Montserrat Light"/>
               </a:defRPr>
             </a:lvl1pPr>
           </a:lstStyle>
@@ -3824,7 +3824,7 @@
       <p:sp>
         <p:nvSpPr>
           <p:cNvPr id="140" name="Lorem ipsum dolere sit met nonummy consecuter es quid. Lorem ipsum dolere sit met nonummy consecuter es quid. Lorem ipsum dolere sit met nonummy consecuter es quid. Lorem ipsum dolere sit met nonummy consecuter es quid."/>
-          <p:cNvSpPr txBox="1"/>
+          <p:cNvSpPr/>
           <p:nvPr/>
         </p:nvSpPr>
         <p:spPr>
@@ -3854,10 +3854,10 @@
                 <a:solidFill>
                   <a:srgbClr val="797979"/>
                 </a:solidFill>
-                <a:latin typeface="Montserrat"/>
-                <a:ea typeface="Montserrat"/>
-                <a:cs typeface="Montserrat"/>
-                <a:sym typeface="Montserrat"/>
+                <a:latin typeface="Montserrat Light"/>
+                <a:ea typeface="Montserrat Light"/>
+                <a:cs typeface="Montserrat Light"/>
+                <a:sym typeface="Montserrat Light"/>
               </a:defRPr>
             </a:lvl1pPr>
           </a:lstStyle>
@@ -3928,7 +3928,7 @@
       <p:sp>
         <p:nvSpPr>
           <p:cNvPr id="143" name="TITLE SPONSORS"/>
-          <p:cNvSpPr txBox="1"/>
+          <p:cNvSpPr/>
           <p:nvPr/>
         </p:nvSpPr>
         <p:spPr>
@@ -3958,10 +3958,10 @@
                 <a:solidFill>
                   <a:srgbClr val="53585F"/>
                 </a:solidFill>
-                <a:latin typeface="Montserrat"/>
-                <a:ea typeface="Montserrat"/>
-                <a:cs typeface="Montserrat"/>
-                <a:sym typeface="Montserrat"/>
+                <a:latin typeface="Montserrat Light"/>
+                <a:ea typeface="Montserrat Light"/>
+                <a:cs typeface="Montserrat Light"/>
+                <a:sym typeface="Montserrat Light"/>
               </a:defRPr>
             </a:lvl1pPr>
           </a:lstStyle>
@@ -4007,12 +4007,12 @@
       <p:sp>
         <p:nvSpPr>
           <p:cNvPr id="145" name="TRACK SPONSORS"/>
-          <p:cNvSpPr txBox="1"/>
+          <p:cNvSpPr/>
           <p:nvPr/>
         </p:nvSpPr>
         <p:spPr>
           <a:xfrm>
-            <a:off x="1286941" y="6327775"/>
+            <a:off x="1286941" y="7356475"/>
             <a:ext cx="21784718" cy="876301"/>
           </a:xfrm>
           <a:prstGeom prst="rect">
@@ -4037,10 +4037,10 @@
                 <a:solidFill>
                   <a:srgbClr val="53585F"/>
                 </a:solidFill>
-                <a:latin typeface="Montserrat"/>
-                <a:ea typeface="Montserrat"/>
-                <a:cs typeface="Montserrat"/>
-                <a:sym typeface="Montserrat"/>
+                <a:latin typeface="Montserrat Light"/>
+                <a:ea typeface="Montserrat Light"/>
+                <a:cs typeface="Montserrat Light"/>
+                <a:sym typeface="Montserrat Light"/>
               </a:defRPr>
             </a:lvl1pPr>
           </a:lstStyle>
@@ -4060,7 +4060,7 @@
         </p:nvSpPr>
         <p:spPr>
           <a:xfrm>
-            <a:off x="1283985" y="7375525"/>
+            <a:off x="1283985" y="8404225"/>
             <a:ext cx="19362409" cy="0"/>
           </a:xfrm>
           <a:prstGeom prst="line">
@@ -4083,219 +4083,16 @@
           </a:p>
         </p:txBody>
       </p:sp>
-      <p:grpSp>
-        <p:nvGrpSpPr>
-          <p:cNvPr id="153" name="Group"/>
-          <p:cNvGrpSpPr/>
-          <p:nvPr/>
-        </p:nvGrpSpPr>
-        <p:grpSpPr>
-          <a:xfrm>
-            <a:off x="1371600" y="8377535"/>
-            <a:ext cx="15240000" cy="3152131"/>
-            <a:chOff x="45588" y="482604"/>
-            <a:chExt cx="15239999" cy="3152130"/>
-          </a:xfrm>
-        </p:grpSpPr>
-        <p:pic>
-          <p:nvPicPr>
-            <p:cNvPr id="147" name="pasted-image.png" descr="pasted-image.png"/>
-            <p:cNvPicPr>
-              <a:picLocks noChangeAspect="1"/>
-            </p:cNvPicPr>
-            <p:nvPr/>
-          </p:nvPicPr>
-          <p:blipFill>
-            <a:blip r:embed="rId2">
-              <a:alphaModFix amt="80000"/>
-              <a:extLst/>
-            </a:blip>
-            <a:srcRect l="0" t="0" r="0" b="0"/>
-            <a:stretch>
-              <a:fillRect/>
-            </a:stretch>
-          </p:blipFill>
-          <p:spPr>
-            <a:xfrm>
-              <a:off x="45588" y="2423133"/>
-              <a:ext cx="4033939" cy="1042618"/>
-            </a:xfrm>
-            <a:prstGeom prst="rect">
-              <a:avLst/>
-            </a:prstGeom>
-            <a:ln w="12700" cap="flat">
-              <a:noFill/>
-              <a:miter lim="400000"/>
-            </a:ln>
-            <a:effectLst/>
-          </p:spPr>
-        </p:pic>
-        <p:pic>
-          <p:nvPicPr>
-            <p:cNvPr id="148" name="healthgrades-9501271fafb2027cad3260d6e90c7fcaaa94f7fe7b25e342e4cf0b3fe4c9466e.png" descr="healthgrades-9501271fafb2027cad3260d6e90c7fcaaa94f7fe7b25e342e4cf0b3fe4c9466e.png"/>
-            <p:cNvPicPr>
-              <a:picLocks noChangeAspect="1"/>
-            </p:cNvPicPr>
-            <p:nvPr/>
-          </p:nvPicPr>
-          <p:blipFill>
-            <a:blip r:embed="rId3">
-              <a:extLst/>
-            </a:blip>
-            <a:stretch>
-              <a:fillRect/>
-            </a:stretch>
-          </p:blipFill>
-          <p:spPr>
-            <a:xfrm>
-              <a:off x="45588" y="847297"/>
-              <a:ext cx="4150328" cy="636091"/>
-            </a:xfrm>
-            <a:prstGeom prst="rect">
-              <a:avLst/>
-            </a:prstGeom>
-            <a:ln w="12700" cap="flat">
-              <a:noFill/>
-              <a:miter lim="400000"/>
-            </a:ln>
-            <a:effectLst/>
-          </p:spPr>
-        </p:pic>
-        <p:pic>
-          <p:nvPicPr>
-            <p:cNvPr id="149" name="herman-miller-3212fd3ecd5938d0f16420942b507f23e00df55f7c460d65b7771b32362a0e65.png" descr="herman-miller-3212fd3ecd5938d0f16420942b507f23e00df55f7c460d65b7771b32362a0e65.png"/>
-            <p:cNvPicPr>
-              <a:picLocks noChangeAspect="1"/>
-            </p:cNvPicPr>
-            <p:nvPr/>
-          </p:nvPicPr>
-          <p:blipFill>
-            <a:blip r:embed="rId4">
-              <a:extLst/>
-            </a:blip>
-            <a:stretch>
-              <a:fillRect/>
-            </a:stretch>
-          </p:blipFill>
-          <p:spPr>
-            <a:xfrm>
-              <a:off x="5590425" y="482604"/>
-              <a:ext cx="4150327" cy="1365477"/>
-            </a:xfrm>
-            <a:prstGeom prst="rect">
-              <a:avLst/>
-            </a:prstGeom>
-            <a:ln w="12700" cap="flat">
-              <a:noFill/>
-              <a:miter lim="400000"/>
-            </a:ln>
-            <a:effectLst/>
-          </p:spPr>
-        </p:pic>
-        <p:pic>
-          <p:nvPicPr>
-            <p:cNvPr id="150" name="pendo-9b27173bdc87ce428e0cb09fe5b0bab4cee987eba5ae6af1ba4af5bd2ecc967b.png" descr="pendo-9b27173bdc87ce428e0cb09fe5b0bab4cee987eba5ae6af1ba4af5bd2ecc967b.png"/>
-            <p:cNvPicPr>
-              <a:picLocks noChangeAspect="1"/>
-            </p:cNvPicPr>
-            <p:nvPr/>
-          </p:nvPicPr>
-          <p:blipFill>
-            <a:blip r:embed="rId5">
-              <a:extLst/>
-            </a:blip>
-            <a:stretch>
-              <a:fillRect/>
-            </a:stretch>
-          </p:blipFill>
-          <p:spPr>
-            <a:xfrm>
-              <a:off x="11135262" y="690472"/>
-              <a:ext cx="4150327" cy="949741"/>
-            </a:xfrm>
-            <a:prstGeom prst="rect">
-              <a:avLst/>
-            </a:prstGeom>
-            <a:ln w="12700" cap="flat">
-              <a:noFill/>
-              <a:miter lim="400000"/>
-            </a:ln>
-            <a:effectLst/>
-          </p:spPr>
-        </p:pic>
-        <p:pic>
-          <p:nvPicPr>
-            <p:cNvPr id="151" name="fanatics-14256afba1a56fad4ac3a9184d2057162546cb44d7a2c0109809df73b88dd762.png" descr="fanatics-14256afba1a56fad4ac3a9184d2057162546cb44d7a2c0109809df73b88dd762.png"/>
-            <p:cNvPicPr>
-              <a:picLocks noChangeAspect="1"/>
-            </p:cNvPicPr>
-            <p:nvPr/>
-          </p:nvPicPr>
-          <p:blipFill>
-            <a:blip r:embed="rId6">
-              <a:extLst/>
-            </a:blip>
-            <a:stretch>
-              <a:fillRect/>
-            </a:stretch>
-          </p:blipFill>
-          <p:spPr>
-            <a:xfrm>
-              <a:off x="5756632" y="2254300"/>
-              <a:ext cx="3735295" cy="1380436"/>
-            </a:xfrm>
-            <a:prstGeom prst="rect">
-              <a:avLst/>
-            </a:prstGeom>
-            <a:ln w="12700" cap="flat">
-              <a:noFill/>
-              <a:miter lim="400000"/>
-            </a:ln>
-            <a:effectLst/>
-          </p:spPr>
-        </p:pic>
-        <p:pic>
-          <p:nvPicPr>
-            <p:cNvPr id="152" name="aarp-6c15d4fcb2a5ed35139da45c05448fc9384d1b109d85a1d7fdfbd50ee7be9823.png" descr="aarp-6c15d4fcb2a5ed35139da45c05448fc9384d1b109d85a1d7fdfbd50ee7be9823.png"/>
-            <p:cNvPicPr>
-              <a:picLocks noChangeAspect="1"/>
-            </p:cNvPicPr>
-            <p:nvPr/>
-          </p:nvPicPr>
-          <p:blipFill>
-            <a:blip r:embed="rId7">
-              <a:extLst/>
-            </a:blip>
-            <a:stretch>
-              <a:fillRect/>
-            </a:stretch>
-          </p:blipFill>
-          <p:spPr>
-            <a:xfrm>
-              <a:off x="11110749" y="2615285"/>
-              <a:ext cx="4150327" cy="658466"/>
-            </a:xfrm>
-            <a:prstGeom prst="rect">
-              <a:avLst/>
-            </a:prstGeom>
-            <a:ln w="12700" cap="flat">
-              <a:noFill/>
-              <a:miter lim="400000"/>
-            </a:ln>
-            <a:effectLst/>
-          </p:spPr>
-        </p:pic>
-      </p:grpSp>
       <p:pic>
         <p:nvPicPr>
-          <p:cNvPr id="154" name="pasted-image.pdf" descr="pasted-image.pdf"/>
+          <p:cNvPr id="147" name="pasted-image.pdf" descr="pasted-image.pdf"/>
           <p:cNvPicPr>
             <a:picLocks noChangeAspect="1"/>
           </p:cNvPicPr>
           <p:nvPr/>
         </p:nvPicPr>
         <p:blipFill>
-          <a:blip r:embed="rId8">
+          <a:blip r:embed="rId2">
             <a:extLst/>
           </a:blip>
           <a:stretch>
@@ -4315,179 +4112,64 @@
           </a:ln>
         </p:spPr>
       </p:pic>
-      <p:grpSp>
-        <p:nvGrpSpPr>
-          <p:cNvPr id="160" name="Group"/>
-          <p:cNvGrpSpPr/>
+      <p:pic>
+        <p:nvPicPr>
+          <p:cNvPr id="148" name="pasted-image.tiff" descr="pasted-image.tiff"/>
+          <p:cNvPicPr>
+            <a:picLocks noChangeAspect="1"/>
+          </p:cNvPicPr>
           <p:nvPr/>
-        </p:nvGrpSpPr>
-        <p:grpSpPr>
+        </p:nvPicPr>
+        <p:blipFill>
+          <a:blip r:embed="rId3">
+            <a:extLst/>
+          </a:blip>
+          <a:stretch>
+            <a:fillRect/>
+          </a:stretch>
+        </p:blipFill>
+        <p:spPr>
           <a:xfrm>
-            <a:off x="1334339" y="2439129"/>
-            <a:ext cx="16510001" cy="3458179"/>
-            <a:chOff x="0" y="0"/>
-            <a:chExt cx="16510000" cy="3458178"/>
+            <a:off x="1351914" y="2241550"/>
+            <a:ext cx="15855989" cy="3789482"/>
           </a:xfrm>
-        </p:grpSpPr>
-        <p:pic>
-          <p:nvPicPr>
-            <p:cNvPr id="155" name="pasted-image.png" descr="pasted-image.png"/>
-            <p:cNvPicPr>
-              <a:picLocks noChangeAspect="1"/>
-            </p:cNvPicPr>
-            <p:nvPr/>
-          </p:nvPicPr>
-          <p:blipFill>
-            <a:blip r:embed="rId9">
-              <a:alphaModFix amt="60000"/>
-              <a:extLst/>
-            </a:blip>
-            <a:stretch>
-              <a:fillRect/>
-            </a:stretch>
-          </p:blipFill>
-          <p:spPr>
-            <a:xfrm>
-              <a:off x="6563442" y="231628"/>
-              <a:ext cx="3389889" cy="1186461"/>
-            </a:xfrm>
-            <a:prstGeom prst="rect">
-              <a:avLst/>
-            </a:prstGeom>
-            <a:ln w="12700" cap="flat">
-              <a:noFill/>
-              <a:miter lim="400000"/>
-            </a:ln>
-            <a:effectLst/>
-          </p:spPr>
-        </p:pic>
-        <p:pic>
-          <p:nvPicPr>
-            <p:cNvPr id="156" name="pasted-image.png" descr="pasted-image.png"/>
-            <p:cNvPicPr>
-              <a:picLocks noChangeAspect="1"/>
-            </p:cNvPicPr>
-            <p:nvPr/>
-          </p:nvPicPr>
-          <p:blipFill>
-            <a:blip r:embed="rId10">
-              <a:alphaModFix amt="60000"/>
-              <a:extLst/>
-            </a:blip>
-            <a:stretch>
-              <a:fillRect/>
-            </a:stretch>
-          </p:blipFill>
-          <p:spPr>
-            <a:xfrm>
-              <a:off x="12150992" y="0"/>
-              <a:ext cx="4359008" cy="1649717"/>
-            </a:xfrm>
-            <a:prstGeom prst="rect">
-              <a:avLst/>
-            </a:prstGeom>
-            <a:ln w="12700" cap="flat">
-              <a:noFill/>
-              <a:miter lim="400000"/>
-            </a:ln>
-            <a:effectLst/>
-          </p:spPr>
-        </p:pic>
-        <p:pic>
-          <p:nvPicPr>
-            <p:cNvPr id="157" name="pasted-image.png" descr="pasted-image.png"/>
-            <p:cNvPicPr>
-              <a:picLocks noChangeAspect="1"/>
-            </p:cNvPicPr>
-            <p:nvPr/>
-          </p:nvPicPr>
-          <p:blipFill>
-            <a:blip r:embed="rId11">
-              <a:alphaModFix amt="60000"/>
-              <a:extLst/>
-            </a:blip>
-            <a:stretch>
-              <a:fillRect/>
-            </a:stretch>
-          </p:blipFill>
-          <p:spPr>
-            <a:xfrm>
-              <a:off x="3503657" y="2236548"/>
-              <a:ext cx="3905212" cy="1221631"/>
-            </a:xfrm>
-            <a:prstGeom prst="rect">
-              <a:avLst/>
-            </a:prstGeom>
-            <a:ln w="12700" cap="flat">
-              <a:noFill/>
-              <a:miter lim="400000"/>
-            </a:ln>
-            <a:effectLst/>
-          </p:spPr>
-        </p:pic>
-        <p:pic>
-          <p:nvPicPr>
-            <p:cNvPr id="158" name="wework-2d0a18f5142579724a6b275f682d69ed9978b84831407b184705f9c19ce4614e.jpg" descr="wework-2d0a18f5142579724a6b275f682d69ed9978b84831407b184705f9c19ce4614e.jpg"/>
-            <p:cNvPicPr>
-              <a:picLocks noChangeAspect="1"/>
-            </p:cNvPicPr>
-            <p:nvPr/>
-          </p:nvPicPr>
-          <p:blipFill>
-            <a:blip r:embed="rId12">
-              <a:extLst/>
-            </a:blip>
-            <a:stretch>
-              <a:fillRect/>
-            </a:stretch>
-          </p:blipFill>
-          <p:spPr>
-            <a:xfrm>
-              <a:off x="9007579" y="2165731"/>
-              <a:ext cx="4365782" cy="974666"/>
-            </a:xfrm>
-            <a:prstGeom prst="rect">
-              <a:avLst/>
-            </a:prstGeom>
-            <a:ln w="12700" cap="flat">
-              <a:noFill/>
-              <a:miter lim="400000"/>
-            </a:ln>
-            <a:effectLst/>
-          </p:spPr>
-        </p:pic>
-        <p:pic>
-          <p:nvPicPr>
-            <p:cNvPr id="159" name="aging20-976023d2a58b7d4473af434959cb8e393eb1f4ef5d52c6e813bdd6ceb309bc5d.jpg" descr="aging20-976023d2a58b7d4473af434959cb8e393eb1f4ef5d52c6e813bdd6ceb309bc5d.jpg"/>
-            <p:cNvPicPr>
-              <a:picLocks noChangeAspect="1"/>
-            </p:cNvPicPr>
-            <p:nvPr/>
-          </p:nvPicPr>
-          <p:blipFill>
-            <a:blip r:embed="rId13">
-              <a:extLst/>
-            </a:blip>
-            <a:stretch>
-              <a:fillRect/>
-            </a:stretch>
-          </p:blipFill>
-          <p:spPr>
-            <a:xfrm>
-              <a:off x="0" y="359227"/>
-              <a:ext cx="4365782" cy="1215218"/>
-            </a:xfrm>
-            <a:prstGeom prst="rect">
-              <a:avLst/>
-            </a:prstGeom>
-            <a:ln w="12700" cap="flat">
-              <a:noFill/>
-              <a:miter lim="400000"/>
-            </a:ln>
-            <a:effectLst/>
-          </p:spPr>
-        </p:pic>
-      </p:grpSp>
+          <a:prstGeom prst="rect">
+            <a:avLst/>
+          </a:prstGeom>
+          <a:ln w="12700">
+            <a:miter lim="400000"/>
+          </a:ln>
+        </p:spPr>
+      </p:pic>
+      <p:pic>
+        <p:nvPicPr>
+          <p:cNvPr id="149" name="pasted-image.tiff" descr="pasted-image.tiff"/>
+          <p:cNvPicPr>
+            <a:picLocks noChangeAspect="1"/>
+          </p:cNvPicPr>
+          <p:nvPr/>
+        </p:nvPicPr>
+        <p:blipFill>
+          <a:blip r:embed="rId4">
+            <a:extLst/>
+          </a:blip>
+          <a:stretch>
+            <a:fillRect/>
+          </a:stretch>
+        </p:blipFill>
+        <p:spPr>
+          <a:xfrm>
+            <a:off x="1351914" y="9476308"/>
+            <a:ext cx="18423117" cy="2683519"/>
+          </a:xfrm>
+          <a:prstGeom prst="rect">
+            <a:avLst/>
+          </a:prstGeom>
+          <a:ln w="12700">
+            <a:miter lim="400000"/>
+          </a:ln>
+        </p:spPr>
+      </p:pic>
     </p:spTree>
   </p:cSld>
   <p:clrMapOvr>
@@ -4516,8 +4198,8 @@
       </p:grpSpPr>
       <p:sp>
         <p:nvSpPr>
-          <p:cNvPr id="162" name="headline EVENT SPONSORS"/>
-          <p:cNvSpPr txBox="1"/>
+          <p:cNvPr id="151" name="headline SPONSORS"/>
+          <p:cNvSpPr/>
           <p:nvPr/>
         </p:nvSpPr>
         <p:spPr>
@@ -4547,24 +4229,24 @@
                 <a:solidFill>
                   <a:srgbClr val="53585F"/>
                 </a:solidFill>
-                <a:latin typeface="Montserrat"/>
-                <a:ea typeface="Montserrat"/>
-                <a:cs typeface="Montserrat"/>
-                <a:sym typeface="Montserrat"/>
+                <a:latin typeface="Montserrat Light"/>
+                <a:ea typeface="Montserrat Light"/>
+                <a:cs typeface="Montserrat Light"/>
+                <a:sym typeface="Montserrat Light"/>
               </a:defRPr>
             </a:lvl1pPr>
           </a:lstStyle>
           <a:p>
             <a:pPr/>
             <a:r>
-              <a:t>headline EVENT SPONSORS</a:t>
+              <a:t>headline SPONSORS</a:t>
             </a:r>
           </a:p>
         </p:txBody>
       </p:sp>
       <p:sp>
         <p:nvSpPr>
-          <p:cNvPr id="163" name="Line"/>
+          <p:cNvPr id="152" name="Line"/>
           <p:cNvSpPr/>
           <p:nvPr/>
         </p:nvSpPr>
@@ -4595,13 +4277,13 @@
       </p:sp>
       <p:sp>
         <p:nvSpPr>
-          <p:cNvPr id="164" name="partner SPONSORS"/>
-          <p:cNvSpPr txBox="1"/>
+          <p:cNvPr id="153" name="partner SPONSORS"/>
+          <p:cNvSpPr/>
           <p:nvPr/>
         </p:nvSpPr>
         <p:spPr>
           <a:xfrm>
-            <a:off x="1286941" y="5636941"/>
+            <a:off x="1286941" y="7008541"/>
             <a:ext cx="7584034" cy="876301"/>
           </a:xfrm>
           <a:prstGeom prst="rect">
@@ -4626,10 +4308,10 @@
                 <a:solidFill>
                   <a:srgbClr val="53585F"/>
                 </a:solidFill>
-                <a:latin typeface="Montserrat"/>
-                <a:ea typeface="Montserrat"/>
-                <a:cs typeface="Montserrat"/>
-                <a:sym typeface="Montserrat"/>
+                <a:latin typeface="Montserrat Light"/>
+                <a:ea typeface="Montserrat Light"/>
+                <a:cs typeface="Montserrat Light"/>
+                <a:sym typeface="Montserrat Light"/>
               </a:defRPr>
             </a:lvl1pPr>
           </a:lstStyle>
@@ -4643,13 +4325,13 @@
       </p:sp>
       <p:sp>
         <p:nvSpPr>
-          <p:cNvPr id="165" name="Line"/>
+          <p:cNvPr id="154" name="Line"/>
           <p:cNvSpPr/>
           <p:nvPr/>
         </p:nvSpPr>
         <p:spPr>
           <a:xfrm>
-            <a:off x="1283985" y="6684691"/>
+            <a:off x="1283985" y="8056291"/>
             <a:ext cx="9057699" cy="1"/>
           </a:xfrm>
           <a:prstGeom prst="line">
@@ -4674,7 +4356,7 @@
       </p:sp>
       <p:pic>
         <p:nvPicPr>
-          <p:cNvPr id="166" name="pasted-image.pdf" descr="pasted-image.pdf"/>
+          <p:cNvPr id="155" name="pasted-image.pdf" descr="pasted-image.pdf"/>
           <p:cNvPicPr>
             <a:picLocks noChangeAspect="1"/>
           </p:cNvPicPr>
@@ -4703,13 +4385,13 @@
       </p:pic>
       <p:sp>
         <p:nvSpPr>
-          <p:cNvPr id="167" name="member SPONSORS"/>
-          <p:cNvSpPr txBox="1"/>
+          <p:cNvPr id="156" name="member SPONSORS"/>
+          <p:cNvSpPr/>
           <p:nvPr/>
         </p:nvSpPr>
         <p:spPr>
           <a:xfrm>
-            <a:off x="11561241" y="5636941"/>
+            <a:off x="11561241" y="7008541"/>
             <a:ext cx="7584034" cy="876301"/>
           </a:xfrm>
           <a:prstGeom prst="rect">
@@ -4734,10 +4416,10 @@
                 <a:solidFill>
                   <a:srgbClr val="53585F"/>
                 </a:solidFill>
-                <a:latin typeface="Montserrat"/>
-                <a:ea typeface="Montserrat"/>
-                <a:cs typeface="Montserrat"/>
-                <a:sym typeface="Montserrat"/>
+                <a:latin typeface="Montserrat Light"/>
+                <a:ea typeface="Montserrat Light"/>
+                <a:cs typeface="Montserrat Light"/>
+                <a:sym typeface="Montserrat Light"/>
               </a:defRPr>
             </a:lvl1pPr>
           </a:lstStyle>
@@ -4751,14 +4433,74 @@
       </p:sp>
       <p:sp>
         <p:nvSpPr>
-          <p:cNvPr id="168" name="BakerHostetler…"/>
-          <p:cNvSpPr txBox="1"/>
+          <p:cNvPr id="157" name="Line"/>
+          <p:cNvSpPr/>
           <p:nvPr/>
         </p:nvSpPr>
         <p:spPr>
           <a:xfrm>
-            <a:off x="1286941" y="7032385"/>
-            <a:ext cx="11553776" cy="5535266"/>
+            <a:off x="11583685" y="8056291"/>
+            <a:ext cx="9057699" cy="1"/>
+          </a:xfrm>
+          <a:prstGeom prst="line">
+            <a:avLst/>
+          </a:prstGeom>
+          <a:ln w="12700">
+            <a:solidFill>
+              <a:srgbClr val="EBEBEB"/>
+            </a:solidFill>
+            <a:miter lim="400000"/>
+          </a:ln>
+        </p:spPr>
+        <p:txBody>
+          <a:bodyPr lIns="50800" tIns="50800" rIns="50800" bIns="50800" anchor="ctr"/>
+          <a:lstStyle/>
+          <a:p>
+            <a:pPr>
+              <a:defRPr sz="3200"/>
+            </a:pPr>
+          </a:p>
+        </p:txBody>
+      </p:sp>
+      <p:pic>
+        <p:nvPicPr>
+          <p:cNvPr id="158" name="pasted-image.tiff" descr="pasted-image.tiff"/>
+          <p:cNvPicPr>
+            <a:picLocks noChangeAspect="1"/>
+          </p:cNvPicPr>
+          <p:nvPr/>
+        </p:nvPicPr>
+        <p:blipFill>
+          <a:blip r:embed="rId3">
+            <a:extLst/>
+          </a:blip>
+          <a:stretch>
+            <a:fillRect/>
+          </a:stretch>
+        </p:blipFill>
+        <p:spPr>
+          <a:xfrm>
+            <a:off x="1315697" y="2245675"/>
+            <a:ext cx="16713201" cy="3512927"/>
+          </a:xfrm>
+          <a:prstGeom prst="rect">
+            <a:avLst/>
+          </a:prstGeom>
+          <a:ln w="12700">
+            <a:miter lim="400000"/>
+          </a:ln>
+        </p:spPr>
+      </p:pic>
+      <p:sp>
+        <p:nvSpPr>
+          <p:cNvPr id="159" name="Baker Hostetler…"/>
+          <p:cNvSpPr/>
+          <p:nvPr/>
+        </p:nvSpPr>
+        <p:spPr>
+          <a:xfrm>
+            <a:off x="1310184" y="8416685"/>
+            <a:ext cx="4129592" cy="4435129"/>
           </a:xfrm>
           <a:prstGeom prst="rect">
             <a:avLst/>
@@ -4773,66 +4515,66 @@
           </a:extLst>
         </p:spPr>
         <p:txBody>
-          <a:bodyPr lIns="50800" tIns="50800" rIns="50800" bIns="50800" numCol="2" spcCol="173013"/>
+          <a:bodyPr lIns="27093" tIns="27093" rIns="27093" bIns="27093"/>
           <a:lstStyle/>
           <a:p>
-            <a:pPr algn="l">
-              <a:defRPr spc="-48" sz="2400">
+            <a:pPr algn="l" defTabSz="587022">
+              <a:defRPr spc="-44" sz="2200">
                 <a:solidFill>
                   <a:srgbClr val="797979"/>
                 </a:solidFill>
-                <a:latin typeface="Montserrat"/>
-                <a:ea typeface="Montserrat"/>
-                <a:cs typeface="Montserrat"/>
-                <a:sym typeface="Montserrat"/>
+                <a:latin typeface="Montserrat Light"/>
+                <a:ea typeface="Montserrat Light"/>
+                <a:cs typeface="Montserrat Light"/>
+                <a:sym typeface="Montserrat Light"/>
               </a:defRPr>
             </a:pPr>
             <a:r>
-              <a:t>BakerHostetler</a:t>
-            </a:r>
-          </a:p>
-          <a:p>
-            <a:pPr algn="l">
-              <a:defRPr spc="-48" sz="2400">
+              <a:t>Baker Hostetler</a:t>
+            </a:r>
+          </a:p>
+          <a:p>
+            <a:pPr algn="l" defTabSz="587022">
+              <a:defRPr spc="-44" sz="2200">
                 <a:solidFill>
                   <a:srgbClr val="797979"/>
                 </a:solidFill>
-                <a:latin typeface="Montserrat"/>
-                <a:ea typeface="Montserrat"/>
-                <a:cs typeface="Montserrat"/>
-                <a:sym typeface="Montserrat"/>
+                <a:latin typeface="Montserrat Light"/>
+                <a:ea typeface="Montserrat Light"/>
+                <a:cs typeface="Montserrat Light"/>
+                <a:sym typeface="Montserrat Light"/>
               </a:defRPr>
             </a:pPr>
             <a:r>
-              <a:t>Bradford LTD</a:t>
-            </a:r>
-          </a:p>
-          <a:p>
-            <a:pPr algn="l">
-              <a:defRPr spc="-48" sz="2400">
+              <a:t>Bradford, LTD</a:t>
+            </a:r>
+          </a:p>
+          <a:p>
+            <a:pPr algn="l" defTabSz="587022">
+              <a:defRPr spc="-44" sz="2200">
                 <a:solidFill>
                   <a:srgbClr val="797979"/>
                 </a:solidFill>
-                <a:latin typeface="Montserrat"/>
-                <a:ea typeface="Montserrat"/>
-                <a:cs typeface="Montserrat"/>
-                <a:sym typeface="Montserrat"/>
+                <a:latin typeface="Montserrat Light"/>
+                <a:ea typeface="Montserrat Light"/>
+                <a:cs typeface="Montserrat Light"/>
+                <a:sym typeface="Montserrat Light"/>
               </a:defRPr>
             </a:pPr>
             <a:r>
-              <a:t>Capital One Cafe</a:t>
-            </a:r>
-          </a:p>
-          <a:p>
-            <a:pPr algn="l">
-              <a:defRPr spc="-48" sz="2400">
+              <a:t>Capital One</a:t>
+            </a:r>
+          </a:p>
+          <a:p>
+            <a:pPr algn="l" defTabSz="587022">
+              <a:defRPr spc="-44" sz="2200">
                 <a:solidFill>
                   <a:srgbClr val="797979"/>
                 </a:solidFill>
-                <a:latin typeface="Montserrat"/>
-                <a:ea typeface="Montserrat"/>
-                <a:cs typeface="Montserrat"/>
-                <a:sym typeface="Montserrat"/>
+                <a:latin typeface="Montserrat Light"/>
+                <a:ea typeface="Montserrat Light"/>
+                <a:cs typeface="Montserrat Light"/>
+                <a:sym typeface="Montserrat Light"/>
               </a:defRPr>
             </a:pPr>
             <a:r>
@@ -4840,15 +4582,15 @@
             </a:r>
           </a:p>
           <a:p>
-            <a:pPr algn="l">
-              <a:defRPr spc="-48" sz="2400">
+            <a:pPr algn="l" defTabSz="587022">
+              <a:defRPr spc="-44" sz="2200">
                 <a:solidFill>
                   <a:srgbClr val="797979"/>
                 </a:solidFill>
-                <a:latin typeface="Montserrat"/>
-                <a:ea typeface="Montserrat"/>
-                <a:cs typeface="Montserrat"/>
-                <a:sym typeface="Montserrat"/>
+                <a:latin typeface="Montserrat Light"/>
+                <a:ea typeface="Montserrat Light"/>
+                <a:cs typeface="Montserrat Light"/>
+                <a:sym typeface="Montserrat Light"/>
               </a:defRPr>
             </a:pPr>
             <a:r>
@@ -4856,31 +4598,31 @@
             </a:r>
           </a:p>
           <a:p>
-            <a:pPr algn="l">
-              <a:defRPr spc="-48" sz="2400">
+            <a:pPr algn="l" defTabSz="587022">
+              <a:defRPr spc="-44" sz="2200">
                 <a:solidFill>
                   <a:srgbClr val="797979"/>
                 </a:solidFill>
-                <a:latin typeface="Montserrat"/>
-                <a:ea typeface="Montserrat"/>
-                <a:cs typeface="Montserrat"/>
-                <a:sym typeface="Montserrat"/>
+                <a:latin typeface="Montserrat Light"/>
+                <a:ea typeface="Montserrat Light"/>
+                <a:cs typeface="Montserrat Light"/>
+                <a:sym typeface="Montserrat Light"/>
               </a:defRPr>
             </a:pPr>
             <a:r>
-              <a:t>Connect for Health Colorado</a:t>
-            </a:r>
-          </a:p>
-          <a:p>
-            <a:pPr algn="l">
-              <a:defRPr spc="-48" sz="2400">
+              <a:t>Connect For Health Colorado</a:t>
+            </a:r>
+          </a:p>
+          <a:p>
+            <a:pPr algn="l" defTabSz="587022">
+              <a:defRPr spc="-44" sz="2200">
                 <a:solidFill>
                   <a:srgbClr val="797979"/>
                 </a:solidFill>
-                <a:latin typeface="Montserrat"/>
-                <a:ea typeface="Montserrat"/>
-                <a:cs typeface="Montserrat"/>
-                <a:sym typeface="Montserrat"/>
+                <a:latin typeface="Montserrat Light"/>
+                <a:ea typeface="Montserrat Light"/>
+                <a:cs typeface="Montserrat Light"/>
+                <a:sym typeface="Montserrat Light"/>
               </a:defRPr>
             </a:pPr>
             <a:r>
@@ -4888,304 +4630,97 @@
             </a:r>
           </a:p>
           <a:p>
-            <a:pPr algn="l">
-              <a:defRPr spc="-48" sz="2400">
+            <a:pPr algn="l" defTabSz="587022">
+              <a:defRPr spc="-44" sz="2200">
                 <a:solidFill>
                   <a:srgbClr val="797979"/>
                 </a:solidFill>
-                <a:latin typeface="Montserrat"/>
-                <a:ea typeface="Montserrat"/>
-                <a:cs typeface="Montserrat"/>
-                <a:sym typeface="Montserrat"/>
+                <a:latin typeface="Montserrat Light"/>
+                <a:ea typeface="Montserrat Light"/>
+                <a:cs typeface="Montserrat Light"/>
+                <a:sym typeface="Montserrat Light"/>
               </a:defRPr>
             </a:pPr>
             <a:r>
-              <a:t>Corus360 / Intersect Alliance</a:t>
-            </a:r>
-          </a:p>
-          <a:p>
-            <a:pPr algn="l">
-              <a:defRPr spc="-48" sz="2400">
+              <a:t>Corus360</a:t>
+            </a:r>
+          </a:p>
+          <a:p>
+            <a:pPr algn="l" defTabSz="587022">
+              <a:defRPr spc="-44" sz="2200">
                 <a:solidFill>
                   <a:srgbClr val="797979"/>
                 </a:solidFill>
-                <a:latin typeface="Montserrat"/>
-                <a:ea typeface="Montserrat"/>
-                <a:cs typeface="Montserrat"/>
-                <a:sym typeface="Montserrat"/>
+                <a:latin typeface="Montserrat Light"/>
+                <a:ea typeface="Montserrat Light"/>
+                <a:cs typeface="Montserrat Light"/>
+                <a:sym typeface="Montserrat Light"/>
               </a:defRPr>
             </a:pPr>
             <a:r>
-              <a:t>City and County of Denver Office of Economic Development</a:t>
-            </a:r>
-          </a:p>
-          <a:p>
-            <a:pPr algn="l">
-              <a:defRPr spc="-48" sz="2400">
+              <a:t>EKS &amp; H</a:t>
+            </a:r>
+          </a:p>
+          <a:p>
+            <a:pPr algn="l" defTabSz="587022">
+              <a:defRPr spc="-44" sz="2200">
                 <a:solidFill>
                   <a:srgbClr val="797979"/>
                 </a:solidFill>
-                <a:latin typeface="Montserrat"/>
-                <a:ea typeface="Montserrat"/>
-                <a:cs typeface="Montserrat"/>
-                <a:sym typeface="Montserrat"/>
+                <a:latin typeface="Montserrat Light"/>
+                <a:ea typeface="Montserrat Light"/>
+                <a:cs typeface="Montserrat Light"/>
+                <a:sym typeface="Montserrat Light"/>
               </a:defRPr>
             </a:pPr>
             <a:r>
-              <a:t>EKS&amp;H</a:t>
-            </a:r>
-          </a:p>
-          <a:p>
-            <a:pPr algn="l">
-              <a:defRPr spc="-48" sz="2400">
+              <a:t>Event Integrity</a:t>
+            </a:r>
+          </a:p>
+          <a:p>
+            <a:pPr algn="l" defTabSz="587022">
+              <a:defRPr spc="-44" sz="2200">
                 <a:solidFill>
                   <a:srgbClr val="797979"/>
                 </a:solidFill>
-                <a:latin typeface="Montserrat"/>
-                <a:ea typeface="Montserrat"/>
-                <a:cs typeface="Montserrat"/>
-                <a:sym typeface="Montserrat"/>
+                <a:latin typeface="Montserrat Light"/>
+                <a:ea typeface="Montserrat Light"/>
+                <a:cs typeface="Montserrat Light"/>
+                <a:sym typeface="Montserrat Light"/>
               </a:defRPr>
             </a:pPr>
             <a:r>
-              <a:t>Event Integrity</a:t>
-            </a:r>
-          </a:p>
-          <a:p>
-            <a:pPr algn="l">
-              <a:defRPr spc="-48" sz="2400">
+              <a:t>Full Contact</a:t>
+            </a:r>
+          </a:p>
+          <a:p>
+            <a:pPr algn="l" defTabSz="587022">
+              <a:defRPr spc="-44" sz="2200">
                 <a:solidFill>
                   <a:srgbClr val="797979"/>
                 </a:solidFill>
-                <a:latin typeface="Montserrat"/>
-                <a:ea typeface="Montserrat"/>
-                <a:cs typeface="Montserrat"/>
-                <a:sym typeface="Montserrat"/>
+                <a:latin typeface="Montserrat Light"/>
+                <a:ea typeface="Montserrat Light"/>
+                <a:cs typeface="Montserrat Light"/>
+                <a:sym typeface="Montserrat Light"/>
               </a:defRPr>
             </a:pPr>
             <a:r>
-              <a:t>FullContact</a:t>
-            </a:r>
-          </a:p>
-          <a:p>
-            <a:pPr algn="l">
-              <a:defRPr spc="-48" sz="2400">
-                <a:solidFill>
-                  <a:srgbClr val="797979"/>
-                </a:solidFill>
-                <a:latin typeface="Montserrat"/>
-                <a:ea typeface="Montserrat"/>
-                <a:cs typeface="Montserrat"/>
-                <a:sym typeface="Montserrat"/>
-              </a:defRPr>
-            </a:pPr>
-            <a:r>
               <a:t>Gary Community Investments</a:t>
-            </a:r>
-          </a:p>
-          <a:p>
-            <a:pPr algn="l">
-              <a:defRPr spc="-48" sz="2400">
-                <a:solidFill>
-                  <a:srgbClr val="797979"/>
-                </a:solidFill>
-                <a:latin typeface="Montserrat"/>
-                <a:ea typeface="Montserrat"/>
-                <a:cs typeface="Montserrat"/>
-                <a:sym typeface="Montserrat"/>
-              </a:defRPr>
-            </a:pPr>
-            <a:r>
-              <a:t>General Assembly</a:t>
-            </a:r>
-          </a:p>
-          <a:p>
-            <a:pPr algn="l">
-              <a:defRPr spc="-48" sz="2400">
-                <a:solidFill>
-                  <a:srgbClr val="797979"/>
-                </a:solidFill>
-                <a:latin typeface="Montserrat"/>
-                <a:ea typeface="Montserrat"/>
-                <a:cs typeface="Montserrat"/>
-                <a:sym typeface="Montserrat"/>
-              </a:defRPr>
-            </a:pPr>
-            <a:r>
-              <a:t>GroundFloor Media</a:t>
-            </a:r>
-          </a:p>
-          <a:p>
-            <a:pPr algn="l">
-              <a:defRPr spc="-48" sz="2400">
-                <a:solidFill>
-                  <a:srgbClr val="797979"/>
-                </a:solidFill>
-                <a:latin typeface="Montserrat"/>
-                <a:ea typeface="Montserrat"/>
-                <a:cs typeface="Montserrat"/>
-                <a:sym typeface="Montserrat"/>
-              </a:defRPr>
-            </a:pPr>
-            <a:r>
-              <a:t>Guiceworks</a:t>
-            </a:r>
-          </a:p>
-          <a:p>
-            <a:pPr algn="l">
-              <a:defRPr spc="-48" sz="2400">
-                <a:solidFill>
-                  <a:srgbClr val="797979"/>
-                </a:solidFill>
-                <a:latin typeface="Montserrat"/>
-                <a:ea typeface="Montserrat"/>
-                <a:cs typeface="Montserrat"/>
-                <a:sym typeface="Montserrat"/>
-              </a:defRPr>
-            </a:pPr>
-            <a:r>
-              <a:t>Imageseller</a:t>
-            </a:r>
-          </a:p>
-          <a:p>
-            <a:pPr algn="l">
-              <a:defRPr spc="-48" sz="2400">
-                <a:solidFill>
-                  <a:srgbClr val="797979"/>
-                </a:solidFill>
-                <a:latin typeface="Montserrat"/>
-                <a:ea typeface="Montserrat"/>
-                <a:cs typeface="Montserrat"/>
-                <a:sym typeface="Montserrat"/>
-              </a:defRPr>
-            </a:pPr>
-            <a:r>
-              <a:t>Inkmonstr</a:t>
-            </a:r>
-          </a:p>
-          <a:p>
-            <a:pPr algn="l">
-              <a:defRPr spc="-48" sz="2400">
-                <a:solidFill>
-                  <a:srgbClr val="797979"/>
-                </a:solidFill>
-                <a:latin typeface="Montserrat"/>
-                <a:ea typeface="Montserrat"/>
-                <a:cs typeface="Montserrat"/>
-                <a:sym typeface="Montserrat"/>
-              </a:defRPr>
-            </a:pPr>
-            <a:r>
-              <a:t>Intelivideo</a:t>
-            </a:r>
-          </a:p>
-          <a:p>
-            <a:pPr algn="l">
-              <a:defRPr spc="-48" sz="2400">
-                <a:solidFill>
-                  <a:srgbClr val="797979"/>
-                </a:solidFill>
-                <a:latin typeface="Montserrat"/>
-                <a:ea typeface="Montserrat"/>
-                <a:cs typeface="Montserrat"/>
-                <a:sym typeface="Montserrat"/>
-              </a:defRPr>
-            </a:pPr>
-            <a:r>
-              <a:t>Nanno</a:t>
-            </a:r>
-          </a:p>
-          <a:p>
-            <a:pPr algn="l">
-              <a:defRPr spc="-48" sz="2400">
-                <a:solidFill>
-                  <a:srgbClr val="797979"/>
-                </a:solidFill>
-                <a:latin typeface="Montserrat"/>
-                <a:ea typeface="Montserrat"/>
-                <a:cs typeface="Montserrat"/>
-                <a:sym typeface="Montserrat"/>
-              </a:defRPr>
-            </a:pPr>
-            <a:r>
-              <a:t>Pass Gas Denver</a:t>
-            </a:r>
-          </a:p>
-          <a:p>
-            <a:pPr algn="l">
-              <a:defRPr spc="-48" sz="2400">
-                <a:solidFill>
-                  <a:srgbClr val="797979"/>
-                </a:solidFill>
-                <a:latin typeface="Montserrat"/>
-                <a:ea typeface="Montserrat"/>
-                <a:cs typeface="Montserrat"/>
-                <a:sym typeface="Montserrat"/>
-              </a:defRPr>
-            </a:pPr>
-            <a:r>
-              <a:t>Slalom</a:t>
-            </a:r>
-          </a:p>
-          <a:p>
-            <a:pPr algn="l">
-              <a:defRPr spc="-48" sz="2400">
-                <a:solidFill>
-                  <a:srgbClr val="797979"/>
-                </a:solidFill>
-                <a:latin typeface="Montserrat"/>
-                <a:ea typeface="Montserrat"/>
-                <a:cs typeface="Montserrat"/>
-                <a:sym typeface="Montserrat"/>
-              </a:defRPr>
-            </a:pPr>
-            <a:r>
-              <a:t>Wazee Digital</a:t>
             </a:r>
           </a:p>
         </p:txBody>
       </p:sp>
       <p:sp>
         <p:nvSpPr>
-          <p:cNvPr id="169" name="Line"/>
+          <p:cNvPr id="160" name="General Assembly…"/>
           <p:cNvSpPr/>
           <p:nvPr/>
         </p:nvSpPr>
         <p:spPr>
           <a:xfrm>
-            <a:off x="11583685" y="6684691"/>
-            <a:ext cx="9057699" cy="1"/>
-          </a:xfrm>
-          <a:prstGeom prst="line">
-            <a:avLst/>
-          </a:prstGeom>
-          <a:ln w="12700">
-            <a:solidFill>
-              <a:srgbClr val="EBEBEB"/>
-            </a:solidFill>
-            <a:miter lim="400000"/>
-          </a:ln>
-        </p:spPr>
-        <p:txBody>
-          <a:bodyPr lIns="50800" tIns="50800" rIns="50800" bIns="50800" anchor="ctr"/>
-          <a:lstStyle/>
-          <a:p>
-            <a:pPr>
-              <a:defRPr sz="3200"/>
-            </a:pPr>
-          </a:p>
-        </p:txBody>
-      </p:sp>
-      <p:sp>
-        <p:nvSpPr>
-          <p:cNvPr id="170" name="Accenture…"/>
-          <p:cNvSpPr txBox="1"/>
-          <p:nvPr/>
-        </p:nvSpPr>
-        <p:spPr>
-          <a:xfrm>
-            <a:off x="11650141" y="7032385"/>
-            <a:ext cx="9057699" cy="5535266"/>
+            <a:off x="5840698" y="8416685"/>
+            <a:ext cx="4620579" cy="4409729"/>
           </a:xfrm>
           <a:prstGeom prst="rect">
             <a:avLst/>
@@ -5200,558 +4735,466 @@
           </a:extLst>
         </p:spPr>
         <p:txBody>
-          <a:bodyPr lIns="50800" tIns="50800" rIns="50800" bIns="50800" numCol="2" spcCol="135635"/>
+          <a:bodyPr lIns="27093" tIns="27093" rIns="27093" bIns="27093"/>
           <a:lstStyle/>
           <a:p>
-            <a:pPr algn="l">
-              <a:defRPr spc="-48" sz="2400">
+            <a:pPr algn="l" defTabSz="587022">
+              <a:defRPr spc="-44" sz="2200">
                 <a:solidFill>
                   <a:srgbClr val="797979"/>
                 </a:solidFill>
-                <a:latin typeface="Montserrat"/>
-                <a:ea typeface="Montserrat"/>
-                <a:cs typeface="Montserrat"/>
-                <a:sym typeface="Montserrat"/>
+                <a:latin typeface="Montserrat Light"/>
+                <a:ea typeface="Montserrat Light"/>
+                <a:cs typeface="Montserrat Light"/>
+                <a:sym typeface="Montserrat Light"/>
               </a:defRPr>
             </a:pPr>
             <a:r>
-              <a:t>Accenture</a:t>
-            </a:r>
-          </a:p>
-          <a:p>
-            <a:pPr algn="l">
-              <a:defRPr spc="-48" sz="2400">
+              <a:t>General Assembly</a:t>
+            </a:r>
+          </a:p>
+          <a:p>
+            <a:pPr algn="l" defTabSz="587022">
+              <a:defRPr spc="-44" sz="2200">
                 <a:solidFill>
                   <a:srgbClr val="797979"/>
                 </a:solidFill>
-                <a:latin typeface="Montserrat"/>
-                <a:ea typeface="Montserrat"/>
-                <a:cs typeface="Montserrat"/>
-                <a:sym typeface="Montserrat"/>
+                <a:latin typeface="Montserrat Light"/>
+                <a:ea typeface="Montserrat Light"/>
+                <a:cs typeface="Montserrat Light"/>
+                <a:sym typeface="Montserrat Light"/>
               </a:defRPr>
             </a:pPr>
             <a:r>
-              <a:t>Bridgepoint Education</a:t>
-            </a:r>
-          </a:p>
-          <a:p>
-            <a:pPr algn="l">
-              <a:defRPr spc="-48" sz="2400">
+              <a:t>Groundfloor Media / CenterTable</a:t>
+            </a:r>
+          </a:p>
+          <a:p>
+            <a:pPr algn="l" defTabSz="587022">
+              <a:defRPr spc="-44" sz="2200">
                 <a:solidFill>
                   <a:srgbClr val="797979"/>
                 </a:solidFill>
-                <a:latin typeface="Montserrat"/>
-                <a:ea typeface="Montserrat"/>
-                <a:cs typeface="Montserrat"/>
-                <a:sym typeface="Montserrat"/>
+                <a:latin typeface="Montserrat Light"/>
+                <a:ea typeface="Montserrat Light"/>
+                <a:cs typeface="Montserrat Light"/>
+                <a:sym typeface="Montserrat Light"/>
               </a:defRPr>
             </a:pPr>
             <a:r>
-              <a:t>Butler Snow</a:t>
-            </a:r>
-          </a:p>
-          <a:p>
-            <a:pPr algn="l">
-              <a:defRPr spc="-48" sz="2400">
+              <a:t>Guiceworks</a:t>
+            </a:r>
+          </a:p>
+          <a:p>
+            <a:pPr algn="l" defTabSz="587022">
+              <a:defRPr spc="-44" sz="2200">
                 <a:solidFill>
                   <a:srgbClr val="797979"/>
                 </a:solidFill>
-                <a:latin typeface="Montserrat"/>
-                <a:ea typeface="Montserrat"/>
-                <a:cs typeface="Montserrat"/>
-                <a:sym typeface="Montserrat"/>
+                <a:latin typeface="Montserrat Light"/>
+                <a:ea typeface="Montserrat Light"/>
+                <a:cs typeface="Montserrat Light"/>
+                <a:sym typeface="Montserrat Light"/>
               </a:defRPr>
             </a:pPr>
             <a:r>
-              <a:t>Delta Tables</a:t>
-            </a:r>
-          </a:p>
-          <a:p>
-            <a:pPr algn="l">
-              <a:defRPr spc="-48" sz="2400">
+              <a:t>ImageSeller</a:t>
+            </a:r>
+          </a:p>
+          <a:p>
+            <a:pPr algn="l" defTabSz="587022">
+              <a:defRPr spc="-44" sz="2200">
                 <a:solidFill>
                   <a:srgbClr val="797979"/>
                 </a:solidFill>
-                <a:latin typeface="Montserrat"/>
-                <a:ea typeface="Montserrat"/>
-                <a:cs typeface="Montserrat"/>
-                <a:sym typeface="Montserrat"/>
+                <a:latin typeface="Montserrat Light"/>
+                <a:ea typeface="Montserrat Light"/>
+                <a:cs typeface="Montserrat Light"/>
+                <a:sym typeface="Montserrat Light"/>
               </a:defRPr>
             </a:pPr>
             <a:r>
-              <a:t>Denver Foundation</a:t>
-            </a:r>
-          </a:p>
-          <a:p>
-            <a:pPr algn="l">
-              <a:defRPr spc="-48" sz="2400">
+              <a:t>Ink Monstr</a:t>
+            </a:r>
+          </a:p>
+          <a:p>
+            <a:pPr algn="l" defTabSz="587022">
+              <a:defRPr spc="-44" sz="2200">
                 <a:solidFill>
                   <a:srgbClr val="797979"/>
                 </a:solidFill>
-                <a:latin typeface="Montserrat"/>
-                <a:ea typeface="Montserrat"/>
-                <a:cs typeface="Montserrat"/>
-                <a:sym typeface="Montserrat"/>
+                <a:latin typeface="Montserrat Light"/>
+                <a:ea typeface="Montserrat Light"/>
+                <a:cs typeface="Montserrat Light"/>
+                <a:sym typeface="Montserrat Light"/>
               </a:defRPr>
             </a:pPr>
             <a:r>
-              <a:t>Hogan Lovells</a:t>
-            </a:r>
-          </a:p>
-          <a:p>
-            <a:pPr algn="l">
-              <a:defRPr spc="-48" sz="2400">
+              <a:t>Intelivideo</a:t>
+            </a:r>
+          </a:p>
+          <a:p>
+            <a:pPr algn="l" defTabSz="587022">
+              <a:defRPr spc="-44" sz="2200">
                 <a:solidFill>
                   <a:srgbClr val="797979"/>
                 </a:solidFill>
-                <a:latin typeface="Montserrat"/>
-                <a:ea typeface="Montserrat"/>
-                <a:cs typeface="Montserrat"/>
-                <a:sym typeface="Montserrat"/>
+                <a:latin typeface="Montserrat Light"/>
+                <a:ea typeface="Montserrat Light"/>
+                <a:cs typeface="Montserrat Light"/>
+                <a:sym typeface="Montserrat Light"/>
               </a:defRPr>
             </a:pPr>
             <a:r>
-              <a:t>Meyer Law</a:t>
-            </a:r>
-          </a:p>
-          <a:p>
-            <a:pPr algn="l">
-              <a:defRPr spc="-48" sz="2400">
+              <a:t>Luna Gourmet Coffee &amp; Tea</a:t>
+            </a:r>
+          </a:p>
+          <a:p>
+            <a:pPr algn="l" defTabSz="587022">
+              <a:defRPr spc="-44" sz="2200">
                 <a:solidFill>
                   <a:srgbClr val="797979"/>
                 </a:solidFill>
-                <a:latin typeface="Montserrat"/>
-                <a:ea typeface="Montserrat"/>
-                <a:cs typeface="Montserrat"/>
-                <a:sym typeface="Montserrat"/>
+                <a:latin typeface="Montserrat Light"/>
+                <a:ea typeface="Montserrat Light"/>
+                <a:cs typeface="Montserrat Light"/>
+                <a:sym typeface="Montserrat Light"/>
               </a:defRPr>
             </a:pPr>
             <a:r>
-              <a:t>Name.com</a:t>
-            </a:r>
-          </a:p>
-          <a:p>
-            <a:pPr algn="l">
-              <a:defRPr spc="-48" sz="2400">
+              <a:t>Nanno</a:t>
+            </a:r>
+          </a:p>
+          <a:p>
+            <a:pPr algn="l" defTabSz="587022">
+              <a:defRPr spc="-44" sz="2200">
                 <a:solidFill>
                   <a:srgbClr val="797979"/>
                 </a:solidFill>
-                <a:latin typeface="Montserrat"/>
-                <a:ea typeface="Montserrat"/>
-                <a:cs typeface="Montserrat"/>
-                <a:sym typeface="Montserrat"/>
+                <a:latin typeface="Montserrat Light"/>
+                <a:ea typeface="Montserrat Light"/>
+                <a:cs typeface="Montserrat Light"/>
+                <a:sym typeface="Montserrat Light"/>
               </a:defRPr>
             </a:pPr>
             <a:r>
-              <a:t>Slifer, Smith &amp; Frampton</a:t>
-            </a:r>
-          </a:p>
-          <a:p>
-            <a:pPr algn="l">
-              <a:defRPr spc="-48" sz="2400">
+              <a:t>Office of Economic Development</a:t>
+            </a:r>
+          </a:p>
+          <a:p>
+            <a:pPr algn="l" defTabSz="587022">
+              <a:defRPr spc="-44" sz="2200">
                 <a:solidFill>
                   <a:srgbClr val="797979"/>
                 </a:solidFill>
-                <a:latin typeface="Montserrat"/>
-                <a:ea typeface="Montserrat"/>
-                <a:cs typeface="Montserrat"/>
-                <a:sym typeface="Montserrat"/>
+                <a:latin typeface="Montserrat Light"/>
+                <a:ea typeface="Montserrat Light"/>
+                <a:cs typeface="Montserrat Light"/>
+                <a:sym typeface="Montserrat Light"/>
               </a:defRPr>
             </a:pPr>
             <a:r>
-              <a:t>SoGnar</a:t>
-            </a:r>
-          </a:p>
-          <a:p>
-            <a:pPr algn="l">
-              <a:defRPr spc="-48" sz="2400">
+              <a:t>Pass Gas Denver</a:t>
+            </a:r>
+          </a:p>
+          <a:p>
+            <a:pPr algn="l" defTabSz="587022">
+              <a:defRPr spc="-44" sz="2200">
                 <a:solidFill>
                   <a:srgbClr val="797979"/>
                 </a:solidFill>
-                <a:latin typeface="Montserrat"/>
-                <a:ea typeface="Montserrat"/>
-                <a:cs typeface="Montserrat"/>
-                <a:sym typeface="Montserrat"/>
+                <a:latin typeface="Montserrat Light"/>
+                <a:ea typeface="Montserrat Light"/>
+                <a:cs typeface="Montserrat Light"/>
+                <a:sym typeface="Montserrat Light"/>
               </a:defRPr>
             </a:pPr>
             <a:r>
-              <a:t>Swiftpage</a:t>
-            </a:r>
-          </a:p>
-          <a:p>
-            <a:pPr algn="l">
-              <a:defRPr spc="-48" sz="2400">
+              <a:t>Slalom</a:t>
+            </a:r>
+          </a:p>
+          <a:p>
+            <a:pPr algn="l" defTabSz="587022">
+              <a:defRPr spc="-44" sz="2200">
                 <a:solidFill>
                   <a:srgbClr val="797979"/>
                 </a:solidFill>
-                <a:latin typeface="Montserrat"/>
-                <a:ea typeface="Montserrat"/>
-                <a:cs typeface="Montserrat"/>
-                <a:sym typeface="Montserrat"/>
+                <a:latin typeface="Montserrat Light"/>
+                <a:ea typeface="Montserrat Light"/>
+                <a:cs typeface="Montserrat Light"/>
+                <a:sym typeface="Montserrat Light"/>
               </a:defRPr>
             </a:pPr>
             <a:r>
-              <a:t>Zipcar</a:t>
+              <a:t>Wazee Digital</a:t>
             </a:r>
           </a:p>
         </p:txBody>
       </p:sp>
-      <p:grpSp>
-        <p:nvGrpSpPr>
-          <p:cNvPr id="182" name="Group"/>
-          <p:cNvGrpSpPr/>
+      <p:sp>
+        <p:nvSpPr>
+          <p:cNvPr id="161" name="Accenture…"/>
+          <p:cNvSpPr/>
           <p:nvPr/>
-        </p:nvGrpSpPr>
-        <p:grpSpPr>
+        </p:nvSpPr>
+        <p:spPr>
           <a:xfrm>
-            <a:off x="1282700" y="2324100"/>
-            <a:ext cx="17780001" cy="2653150"/>
-            <a:chOff x="0" y="0"/>
-            <a:chExt cx="17780000" cy="2653149"/>
+            <a:off x="11677618" y="8418279"/>
+            <a:ext cx="3420302" cy="2850238"/>
           </a:xfrm>
-        </p:grpSpPr>
-        <p:pic>
-          <p:nvPicPr>
-            <p:cNvPr id="171" name="aarp-6c15d4fcb2a5ed35139da45c05448fc9384d1b109d85a1d7fdfbd50ee7be9823.png" descr="aarp-6c15d4fcb2a5ed35139da45c05448fc9384d1b109d85a1d7fdfbd50ee7be9823.png"/>
-            <p:cNvPicPr>
-              <a:picLocks noChangeAspect="1"/>
-            </p:cNvPicPr>
-            <p:nvPr/>
-          </p:nvPicPr>
-          <p:blipFill>
-            <a:blip r:embed="rId3">
-              <a:extLst/>
-            </a:blip>
-            <a:stretch>
-              <a:fillRect/>
-            </a:stretch>
-          </p:blipFill>
-          <p:spPr>
-            <a:xfrm>
-              <a:off x="0" y="324252"/>
-              <a:ext cx="2205291" cy="349878"/>
-            </a:xfrm>
-            <a:prstGeom prst="rect">
-              <a:avLst/>
-            </a:prstGeom>
-            <a:ln w="12700" cap="flat">
-              <a:noFill/>
-              <a:miter lim="400000"/>
-            </a:ln>
-            <a:effectLst/>
-          </p:spPr>
-        </p:pic>
-        <p:pic>
-          <p:nvPicPr>
-            <p:cNvPr id="172" name="Avnet_logo_tagline_rgb_copy.png" descr="Avnet_logo_tagline_rgb_copy.png"/>
-            <p:cNvPicPr>
-              <a:picLocks noChangeAspect="1"/>
-            </p:cNvPicPr>
-            <p:nvPr/>
-          </p:nvPicPr>
-          <p:blipFill>
-            <a:blip r:embed="rId4">
-              <a:extLst/>
-            </a:blip>
-            <a:stretch>
-              <a:fillRect/>
-            </a:stretch>
-          </p:blipFill>
-          <p:spPr>
-            <a:xfrm>
-              <a:off x="3163669" y="198631"/>
-              <a:ext cx="2205292" cy="601120"/>
-            </a:xfrm>
-            <a:prstGeom prst="rect">
-              <a:avLst/>
-            </a:prstGeom>
-            <a:ln w="12700" cap="flat">
-              <a:noFill/>
-              <a:miter lim="400000"/>
-            </a:ln>
-            <a:effectLst/>
-          </p:spPr>
-        </p:pic>
-        <p:pic>
-          <p:nvPicPr>
-            <p:cNvPr id="173" name="bold-legal-logo_copy.png" descr="bold-legal-logo_copy.png"/>
-            <p:cNvPicPr>
-              <a:picLocks noChangeAspect="1"/>
-            </p:cNvPicPr>
-            <p:nvPr/>
-          </p:nvPicPr>
-          <p:blipFill>
-            <a:blip r:embed="rId5">
-              <a:extLst/>
-            </a:blip>
-            <a:stretch>
-              <a:fillRect/>
-            </a:stretch>
-          </p:blipFill>
-          <p:spPr>
-            <a:xfrm>
-              <a:off x="9491009" y="362249"/>
-              <a:ext cx="2205292" cy="273884"/>
-            </a:xfrm>
-            <a:prstGeom prst="rect">
-              <a:avLst/>
-            </a:prstGeom>
-            <a:ln w="12700" cap="flat">
-              <a:noFill/>
-              <a:miter lim="400000"/>
-            </a:ln>
-            <a:effectLst/>
-          </p:spPr>
-        </p:pic>
-        <p:pic>
-          <p:nvPicPr>
-            <p:cNvPr id="174" name="xero.png" descr="xero.png"/>
-            <p:cNvPicPr>
-              <a:picLocks noChangeAspect="1"/>
-            </p:cNvPicPr>
-            <p:nvPr/>
-          </p:nvPicPr>
-          <p:blipFill>
-            <a:blip r:embed="rId6">
-              <a:extLst/>
-            </a:blip>
-            <a:stretch>
-              <a:fillRect/>
-            </a:stretch>
-          </p:blipFill>
-          <p:spPr>
-            <a:xfrm>
-              <a:off x="6327339" y="0"/>
-              <a:ext cx="2205292" cy="1086594"/>
-            </a:xfrm>
-            <a:prstGeom prst="rect">
-              <a:avLst/>
-            </a:prstGeom>
-            <a:ln w="12700" cap="flat">
-              <a:noFill/>
-              <a:miter lim="400000"/>
-            </a:ln>
-            <a:effectLst/>
-          </p:spPr>
-        </p:pic>
-        <p:pic>
-          <p:nvPicPr>
-            <p:cNvPr id="175" name="Spectrum_Logo_DBlue_RGB_copy.png" descr="Spectrum_Logo_DBlue_RGB_copy.png"/>
-            <p:cNvPicPr>
-              <a:picLocks noChangeAspect="1"/>
-            </p:cNvPicPr>
-            <p:nvPr/>
-          </p:nvPicPr>
-          <p:blipFill>
-            <a:blip r:embed="rId7">
-              <a:extLst/>
-            </a:blip>
-            <a:stretch>
-              <a:fillRect/>
-            </a:stretch>
-          </p:blipFill>
-          <p:spPr>
-            <a:xfrm>
-              <a:off x="2871535" y="1527499"/>
-              <a:ext cx="2205292" cy="462400"/>
-            </a:xfrm>
-            <a:prstGeom prst="rect">
-              <a:avLst/>
-            </a:prstGeom>
-            <a:ln w="12700" cap="flat">
-              <a:noFill/>
-              <a:miter lim="400000"/>
-            </a:ln>
-            <a:effectLst/>
-          </p:spPr>
-        </p:pic>
-        <p:pic>
-          <p:nvPicPr>
-            <p:cNvPr id="176" name="sendgrid-721203d3182321bd84a93ae1c4f7a20a0e3b4c0a2e685ad31e9b1ada204f66e1.png" descr="sendgrid-721203d3182321bd84a93ae1c4f7a20a0e3b4c0a2e685ad31e9b1ada204f66e1.png"/>
-            <p:cNvPicPr>
-              <a:picLocks noChangeAspect="1"/>
-            </p:cNvPicPr>
-            <p:nvPr/>
-          </p:nvPicPr>
-          <p:blipFill>
-            <a:blip r:embed="rId8">
-              <a:extLst/>
-            </a:blip>
-            <a:stretch>
-              <a:fillRect/>
-            </a:stretch>
-          </p:blipFill>
-          <p:spPr>
-            <a:xfrm>
-              <a:off x="6184129" y="1517959"/>
-              <a:ext cx="2205292" cy="481480"/>
-            </a:xfrm>
-            <a:prstGeom prst="rect">
-              <a:avLst/>
-            </a:prstGeom>
-            <a:ln w="12700" cap="flat">
-              <a:noFill/>
-              <a:miter lim="400000"/>
-            </a:ln>
-            <a:effectLst/>
-          </p:spPr>
-        </p:pic>
-        <p:pic>
-          <p:nvPicPr>
-            <p:cNvPr id="177" name="Next50_copy.png" descr="Next50_copy.png"/>
-            <p:cNvPicPr>
-              <a:picLocks noChangeAspect="1"/>
-            </p:cNvPicPr>
-            <p:nvPr/>
-          </p:nvPicPr>
-          <p:blipFill>
-            <a:blip r:embed="rId9">
-              <a:extLst/>
-            </a:blip>
-            <a:stretch>
-              <a:fillRect/>
-            </a:stretch>
-          </p:blipFill>
-          <p:spPr>
-            <a:xfrm>
-              <a:off x="9976735" y="1116129"/>
-              <a:ext cx="1102647" cy="1291479"/>
-            </a:xfrm>
-            <a:prstGeom prst="rect">
-              <a:avLst/>
-            </a:prstGeom>
-            <a:ln w="12700" cap="flat">
-              <a:noFill/>
-              <a:miter lim="400000"/>
-            </a:ln>
-            <a:effectLst/>
-          </p:spPr>
-        </p:pic>
-        <p:pic>
-          <p:nvPicPr>
-            <p:cNvPr id="178" name="Pear_logo_2_color.png" descr="Pear_logo_2_color.png"/>
-            <p:cNvPicPr>
-              <a:picLocks noChangeAspect="1"/>
-            </p:cNvPicPr>
-            <p:nvPr/>
-          </p:nvPicPr>
-          <p:blipFill>
-            <a:blip r:embed="rId10">
-              <a:extLst/>
-            </a:blip>
-            <a:stretch>
-              <a:fillRect/>
-            </a:stretch>
-          </p:blipFill>
-          <p:spPr>
-            <a:xfrm>
-              <a:off x="0" y="1388122"/>
-              <a:ext cx="2205291" cy="741154"/>
-            </a:xfrm>
-            <a:prstGeom prst="rect">
-              <a:avLst/>
-            </a:prstGeom>
-            <a:ln w="12700" cap="flat">
-              <a:noFill/>
-              <a:miter lim="400000"/>
-            </a:ln>
-            <a:effectLst/>
-          </p:spPr>
-        </p:pic>
-        <p:pic>
-          <p:nvPicPr>
-            <p:cNvPr id="179" name="cablecenter-73afaea71fc8f583129be88ac402483ea4ea1ab7fd7d3d0a9e759407844e64b2.png" descr="cablecenter-73afaea71fc8f583129be88ac402483ea4ea1ab7fd7d3d0a9e759407844e64b2.png"/>
-            <p:cNvPicPr>
-              <a:picLocks noChangeAspect="1"/>
-            </p:cNvPicPr>
-            <p:nvPr/>
-          </p:nvPicPr>
-          <p:blipFill>
-            <a:blip r:embed="rId11">
-              <a:extLst/>
-            </a:blip>
-            <a:stretch>
-              <a:fillRect/>
-            </a:stretch>
-          </p:blipFill>
-          <p:spPr>
-            <a:xfrm>
-              <a:off x="12654679" y="337106"/>
-              <a:ext cx="2198666" cy="293156"/>
-            </a:xfrm>
-            <a:prstGeom prst="rect">
-              <a:avLst/>
-            </a:prstGeom>
-            <a:ln w="12700" cap="flat">
-              <a:noFill/>
-              <a:miter lim="400000"/>
-            </a:ln>
-            <a:effectLst/>
-          </p:spPr>
-        </p:pic>
-        <p:pic>
-          <p:nvPicPr>
-            <p:cNvPr id="180" name="xite-8ed23b927eb03cc6066481e9fa6333948e67ae3a1292fe5941ccee033c0cbfc0.png" descr="xite-8ed23b927eb03cc6066481e9fa6333948e67ae3a1292fe5941ccee033c0cbfc0.png"/>
-            <p:cNvPicPr>
-              <a:picLocks noChangeAspect="1"/>
-            </p:cNvPicPr>
-            <p:nvPr/>
-          </p:nvPicPr>
-          <p:blipFill>
-            <a:blip r:embed="rId12">
-              <a:extLst/>
-            </a:blip>
-            <a:stretch>
-              <a:fillRect/>
-            </a:stretch>
-          </p:blipFill>
-          <p:spPr>
-            <a:xfrm>
-              <a:off x="12995749" y="1103797"/>
-              <a:ext cx="2198666" cy="1549353"/>
-            </a:xfrm>
-            <a:prstGeom prst="rect">
-              <a:avLst/>
-            </a:prstGeom>
-            <a:ln w="12700" cap="flat">
-              <a:noFill/>
-              <a:miter lim="400000"/>
-            </a:ln>
-            <a:effectLst/>
-          </p:spPr>
-        </p:pic>
-        <p:pic>
-          <p:nvPicPr>
-            <p:cNvPr id="181" name="Molson_Coors__Converted__copy.png" descr="Molson_Coors__Converted__copy.png"/>
-            <p:cNvPicPr>
-              <a:picLocks noChangeAspect="1"/>
-            </p:cNvPicPr>
-            <p:nvPr/>
-          </p:nvPicPr>
-          <p:blipFill>
-            <a:blip r:embed="rId13">
-              <a:extLst/>
-            </a:blip>
-            <a:stretch>
-              <a:fillRect/>
-            </a:stretch>
-          </p:blipFill>
-          <p:spPr>
-            <a:xfrm>
-              <a:off x="15584388" y="187492"/>
-              <a:ext cx="2195613" cy="623398"/>
-            </a:xfrm>
-            <a:prstGeom prst="rect">
-              <a:avLst/>
-            </a:prstGeom>
-            <a:ln w="12700" cap="flat">
-              <a:noFill/>
-              <a:miter lim="400000"/>
-            </a:ln>
-            <a:effectLst/>
-          </p:spPr>
-        </p:pic>
-      </p:grpSp>
+          <a:prstGeom prst="rect">
+            <a:avLst/>
+          </a:prstGeom>
+          <a:ln w="12700">
+            <a:miter lim="400000"/>
+          </a:ln>
+          <a:extLst>
+            <a:ext uri="{C572A759-6A51-4108-AA02-DFA0A04FC94B}">
+              <ma14:wrappingTextBoxFlag xmlns:ma14="http://schemas.microsoft.com/office/mac/drawingml/2011/main" val="1"/>
+            </a:ext>
+          </a:extLst>
+        </p:spPr>
+        <p:txBody>
+          <a:bodyPr lIns="27093" tIns="27093" rIns="27093" bIns="27093"/>
+          <a:lstStyle/>
+          <a:p>
+            <a:pPr algn="l" defTabSz="587022">
+              <a:defRPr spc="-44" sz="2200">
+                <a:solidFill>
+                  <a:srgbClr val="797979"/>
+                </a:solidFill>
+                <a:latin typeface="Montserrat Light"/>
+                <a:ea typeface="Montserrat Light"/>
+                <a:cs typeface="Montserrat Light"/>
+                <a:sym typeface="Montserrat Light"/>
+              </a:defRPr>
+            </a:pPr>
+            <a:r>
+              <a:t>Accenture</a:t>
+            </a:r>
+          </a:p>
+          <a:p>
+            <a:pPr algn="l" defTabSz="587022">
+              <a:defRPr spc="-44" sz="2200">
+                <a:solidFill>
+                  <a:srgbClr val="797979"/>
+                </a:solidFill>
+                <a:latin typeface="Montserrat Light"/>
+                <a:ea typeface="Montserrat Light"/>
+                <a:cs typeface="Montserrat Light"/>
+                <a:sym typeface="Montserrat Light"/>
+              </a:defRPr>
+            </a:pPr>
+            <a:r>
+              <a:t>Bridgepoint Education</a:t>
+            </a:r>
+          </a:p>
+          <a:p>
+            <a:pPr algn="l" defTabSz="587022">
+              <a:defRPr spc="-44" sz="2200">
+                <a:solidFill>
+                  <a:srgbClr val="797979"/>
+                </a:solidFill>
+                <a:latin typeface="Montserrat Light"/>
+                <a:ea typeface="Montserrat Light"/>
+                <a:cs typeface="Montserrat Light"/>
+                <a:sym typeface="Montserrat Light"/>
+              </a:defRPr>
+            </a:pPr>
+            <a:r>
+              <a:t>Butler Snow</a:t>
+            </a:r>
+          </a:p>
+          <a:p>
+            <a:pPr algn="l" defTabSz="587022">
+              <a:defRPr spc="-44" sz="2200">
+                <a:solidFill>
+                  <a:srgbClr val="797979"/>
+                </a:solidFill>
+                <a:latin typeface="Montserrat Light"/>
+                <a:ea typeface="Montserrat Light"/>
+                <a:cs typeface="Montserrat Light"/>
+                <a:sym typeface="Montserrat Light"/>
+              </a:defRPr>
+            </a:pPr>
+            <a:r>
+              <a:t>Delta Tables</a:t>
+            </a:r>
+          </a:p>
+          <a:p>
+            <a:pPr algn="l" defTabSz="587022">
+              <a:defRPr spc="-44" sz="2200">
+                <a:solidFill>
+                  <a:srgbClr val="797979"/>
+                </a:solidFill>
+                <a:latin typeface="Montserrat Light"/>
+                <a:ea typeface="Montserrat Light"/>
+                <a:cs typeface="Montserrat Light"/>
+                <a:sym typeface="Montserrat Light"/>
+              </a:defRPr>
+            </a:pPr>
+            <a:r>
+              <a:t>Hogan Lovells</a:t>
+            </a:r>
+          </a:p>
+          <a:p>
+            <a:pPr algn="l" defTabSz="587022">
+              <a:defRPr spc="-44" sz="2200">
+                <a:solidFill>
+                  <a:srgbClr val="797979"/>
+                </a:solidFill>
+                <a:latin typeface="Montserrat Light"/>
+                <a:ea typeface="Montserrat Light"/>
+                <a:cs typeface="Montserrat Light"/>
+                <a:sym typeface="Montserrat Light"/>
+              </a:defRPr>
+            </a:pPr>
+            <a:r>
+              <a:t>Meyer Law</a:t>
+            </a:r>
+          </a:p>
+          <a:p>
+            <a:pPr algn="l" defTabSz="587022">
+              <a:defRPr spc="-44" sz="2200">
+                <a:solidFill>
+                  <a:srgbClr val="797979"/>
+                </a:solidFill>
+                <a:latin typeface="Montserrat Light"/>
+                <a:ea typeface="Montserrat Light"/>
+                <a:cs typeface="Montserrat Light"/>
+                <a:sym typeface="Montserrat Light"/>
+              </a:defRPr>
+            </a:pPr>
+            <a:r>
+              <a:t>Name.com</a:t>
+            </a:r>
+          </a:p>
+        </p:txBody>
+      </p:sp>
+      <p:sp>
+        <p:nvSpPr>
+          <p:cNvPr id="162" name="Slifer Smith &amp; Frampton…"/>
+          <p:cNvSpPr/>
+          <p:nvPr/>
+        </p:nvSpPr>
+        <p:spPr>
+          <a:xfrm>
+            <a:off x="16207285" y="8435205"/>
+            <a:ext cx="3820483" cy="2590770"/>
+          </a:xfrm>
+          <a:prstGeom prst="rect">
+            <a:avLst/>
+          </a:prstGeom>
+          <a:ln w="12700">
+            <a:miter lim="400000"/>
+          </a:ln>
+          <a:extLst>
+            <a:ext uri="{C572A759-6A51-4108-AA02-DFA0A04FC94B}">
+              <ma14:wrappingTextBoxFlag xmlns:ma14="http://schemas.microsoft.com/office/mac/drawingml/2011/main" val="1"/>
+            </a:ext>
+          </a:extLst>
+        </p:spPr>
+        <p:txBody>
+          <a:bodyPr lIns="27093" tIns="27093" rIns="27093" bIns="27093"/>
+          <a:lstStyle/>
+          <a:p>
+            <a:pPr algn="l" defTabSz="587022">
+              <a:defRPr spc="-44" sz="2200">
+                <a:solidFill>
+                  <a:srgbClr val="797979"/>
+                </a:solidFill>
+                <a:latin typeface="Montserrat Light"/>
+                <a:ea typeface="Montserrat Light"/>
+                <a:cs typeface="Montserrat Light"/>
+                <a:sym typeface="Montserrat Light"/>
+              </a:defRPr>
+            </a:pPr>
+            <a:r>
+              <a:t>Slifer Smith &amp; Frampton</a:t>
+            </a:r>
+          </a:p>
+          <a:p>
+            <a:pPr algn="l" defTabSz="587022">
+              <a:defRPr spc="-44" sz="2200">
+                <a:solidFill>
+                  <a:srgbClr val="797979"/>
+                </a:solidFill>
+                <a:latin typeface="Montserrat Light"/>
+                <a:ea typeface="Montserrat Light"/>
+                <a:cs typeface="Montserrat Light"/>
+                <a:sym typeface="Montserrat Light"/>
+              </a:defRPr>
+            </a:pPr>
+            <a:r>
+              <a:t>SoGnar</a:t>
+            </a:r>
+          </a:p>
+          <a:p>
+            <a:pPr algn="l" defTabSz="587022">
+              <a:defRPr spc="-44" sz="2200">
+                <a:solidFill>
+                  <a:srgbClr val="797979"/>
+                </a:solidFill>
+                <a:latin typeface="Montserrat Light"/>
+                <a:ea typeface="Montserrat Light"/>
+                <a:cs typeface="Montserrat Light"/>
+                <a:sym typeface="Montserrat Light"/>
+              </a:defRPr>
+            </a:pPr>
+            <a:r>
+              <a:t>Sounddown</a:t>
+            </a:r>
+          </a:p>
+          <a:p>
+            <a:pPr algn="l" defTabSz="587022">
+              <a:defRPr spc="-44" sz="2200">
+                <a:solidFill>
+                  <a:srgbClr val="797979"/>
+                </a:solidFill>
+                <a:latin typeface="Montserrat Light"/>
+                <a:ea typeface="Montserrat Light"/>
+                <a:cs typeface="Montserrat Light"/>
+                <a:sym typeface="Montserrat Light"/>
+              </a:defRPr>
+            </a:pPr>
+            <a:r>
+              <a:t>Swiftpage</a:t>
+            </a:r>
+          </a:p>
+          <a:p>
+            <a:pPr algn="l" defTabSz="587022">
+              <a:defRPr spc="-44" sz="2200">
+                <a:solidFill>
+                  <a:srgbClr val="797979"/>
+                </a:solidFill>
+                <a:latin typeface="Montserrat Light"/>
+                <a:ea typeface="Montserrat Light"/>
+                <a:cs typeface="Montserrat Light"/>
+                <a:sym typeface="Montserrat Light"/>
+              </a:defRPr>
+            </a:pPr>
+            <a:r>
+              <a:t>The Denver Foundation</a:t>
+            </a:r>
+          </a:p>
+          <a:p>
+            <a:pPr algn="l" defTabSz="587022">
+              <a:defRPr spc="-44" sz="2200">
+                <a:solidFill>
+                  <a:srgbClr val="797979"/>
+                </a:solidFill>
+                <a:latin typeface="Montserrat Light"/>
+                <a:ea typeface="Montserrat Light"/>
+                <a:cs typeface="Montserrat Light"/>
+                <a:sym typeface="Montserrat Light"/>
+              </a:defRPr>
+            </a:pPr>
+            <a:r>
+              <a:t>Zipcar</a:t>
+            </a:r>
+          </a:p>
+        </p:txBody>
+      </p:sp>
     </p:spTree>
   </p:cSld>
   <p:clrMapOvr>

</xml_diff>